<commit_message>
writing.pptx を v1 に
</commit_message>
<xml_diff>
--- a/writing.pptx
+++ b/writing.pptx
@@ -5,32 +5,38 @@
     <p:sldMasterId id="2147483669" r:id="rId1"/>
   </p:sldMasterIdLst>
   <p:notesMasterIdLst>
-    <p:notesMasterId r:id="rId25"/>
+    <p:notesMasterId r:id="rId31"/>
   </p:notesMasterIdLst>
   <p:sldIdLst>
     <p:sldId id="440" r:id="rId2"/>
     <p:sldId id="508" r:id="rId3"/>
     <p:sldId id="503" r:id="rId4"/>
     <p:sldId id="504" r:id="rId5"/>
-    <p:sldId id="505" r:id="rId6"/>
-    <p:sldId id="512" r:id="rId7"/>
-    <p:sldId id="506" r:id="rId8"/>
-    <p:sldId id="509" r:id="rId9"/>
-    <p:sldId id="510" r:id="rId10"/>
-    <p:sldId id="511" r:id="rId11"/>
-    <p:sldId id="452" r:id="rId12"/>
-    <p:sldId id="448" r:id="rId13"/>
-    <p:sldId id="450" r:id="rId14"/>
-    <p:sldId id="456" r:id="rId15"/>
-    <p:sldId id="457" r:id="rId16"/>
-    <p:sldId id="474" r:id="rId17"/>
-    <p:sldId id="458" r:id="rId18"/>
+    <p:sldId id="518" r:id="rId6"/>
+    <p:sldId id="505" r:id="rId7"/>
+    <p:sldId id="512" r:id="rId8"/>
+    <p:sldId id="519" r:id="rId9"/>
+    <p:sldId id="506" r:id="rId10"/>
+    <p:sldId id="509" r:id="rId11"/>
+    <p:sldId id="510" r:id="rId12"/>
+    <p:sldId id="511" r:id="rId13"/>
+    <p:sldId id="520" r:id="rId14"/>
+    <p:sldId id="452" r:id="rId15"/>
+    <p:sldId id="448" r:id="rId16"/>
+    <p:sldId id="450" r:id="rId17"/>
+    <p:sldId id="521" r:id="rId18"/>
     <p:sldId id="507" r:id="rId19"/>
-    <p:sldId id="513" r:id="rId20"/>
-    <p:sldId id="479" r:id="rId21"/>
-    <p:sldId id="481" r:id="rId22"/>
-    <p:sldId id="482" r:id="rId23"/>
-    <p:sldId id="483" r:id="rId24"/>
+    <p:sldId id="517" r:id="rId20"/>
+    <p:sldId id="456" r:id="rId21"/>
+    <p:sldId id="457" r:id="rId22"/>
+    <p:sldId id="474" r:id="rId23"/>
+    <p:sldId id="458" r:id="rId24"/>
+    <p:sldId id="513" r:id="rId25"/>
+    <p:sldId id="522" r:id="rId26"/>
+    <p:sldId id="479" r:id="rId27"/>
+    <p:sldId id="481" r:id="rId28"/>
+    <p:sldId id="482" r:id="rId29"/>
+    <p:sldId id="483" r:id="rId30"/>
   </p:sldIdLst>
   <p:sldSz cx="9144000" cy="6858000" type="screen4x3"/>
   <p:notesSz cx="6858000" cy="9144000"/>
@@ -138,21 +144,27 @@
             <p14:sldId id="508"/>
             <p14:sldId id="503"/>
             <p14:sldId id="504"/>
+            <p14:sldId id="518"/>
             <p14:sldId id="505"/>
             <p14:sldId id="512"/>
+            <p14:sldId id="519"/>
             <p14:sldId id="506"/>
             <p14:sldId id="509"/>
             <p14:sldId id="510"/>
             <p14:sldId id="511"/>
+            <p14:sldId id="520"/>
             <p14:sldId id="452"/>
             <p14:sldId id="448"/>
             <p14:sldId id="450"/>
+            <p14:sldId id="521"/>
+            <p14:sldId id="507"/>
+            <p14:sldId id="517"/>
             <p14:sldId id="456"/>
             <p14:sldId id="457"/>
             <p14:sldId id="474"/>
             <p14:sldId id="458"/>
-            <p14:sldId id="507"/>
             <p14:sldId id="513"/>
+            <p14:sldId id="522"/>
             <p14:sldId id="479"/>
             <p14:sldId id="481"/>
             <p14:sldId id="482"/>
@@ -264,7 +276,7 @@
           <a:p>
             <a:fld id="{2ABE53D4-1A7B-4FFE-8A95-4265B045F058}" type="datetimeFigureOut">
               <a:rPr kumimoji="1" lang="ja-JP" altLang="en-US" smtClean="0"/>
-              <a:t>2024/4/24</a:t>
+              <a:t>2024/4/25</a:t>
             </a:fld>
             <a:endParaRPr kumimoji="1" lang="ja-JP" altLang="en-US"/>
           </a:p>
@@ -3058,8 +3070,8 @@
               <a:t>文章の書き方 </a:t>
             </a:r>
             <a:r>
-              <a:rPr lang="en-US" altLang="ja-JP" sz="2800" dirty="0"/>
-              <a:t>v0</a:t>
+              <a:rPr lang="en-US" altLang="ja-JP" sz="2800"/>
+              <a:t>v1</a:t>
             </a:r>
             <a:endParaRPr kumimoji="1" lang="ja-JP" altLang="en-US" sz="2800" dirty="0"/>
           </a:p>
@@ -3403,14 +3415,9 @@
           <a:lstStyle/>
           <a:p>
             <a:r>
-              <a:rPr lang="ja-JP" altLang="en-US" dirty="0"/>
-              <a:t>コンクルーディング</a:t>
-            </a:r>
-            <a:r>
-              <a:rPr lang="ja-JP" altLang="en-US"/>
-              <a:t>・センテンス</a:t>
-            </a:r>
-            <a:endParaRPr kumimoji="1" lang="ja-JP" altLang="en-US" dirty="0"/>
+              <a:rPr kumimoji="1" lang="ja-JP" altLang="en-US" dirty="0"/>
+              <a:t>トピック・センテンス</a:t>
+            </a:r>
           </a:p>
         </p:txBody>
       </p:sp>
@@ -3437,32 +3444,71 @@
           <a:p>
             <a:r>
               <a:rPr lang="ja-JP" altLang="en-US" dirty="0"/>
-              <a:t>コンクルーディング・センテンス</a:t>
+              <a:t>そのパラグラフ全体で述べたい主張をまとめた文</a:t>
             </a:r>
             <a:endParaRPr lang="en-US" altLang="ja-JP" dirty="0"/>
           </a:p>
           <a:p>
             <a:pPr lvl="1"/>
             <a:r>
-              <a:rPr kumimoji="1" lang="ja-JP" altLang="en-US" dirty="0"/>
-              <a:t>トピック・センテンスの内容を別の言い方でまとめたもの</a:t>
-            </a:r>
-            <a:endParaRPr kumimoji="1" lang="en-US" altLang="ja-JP" dirty="0"/>
+              <a:rPr lang="ja-JP" altLang="en-US" dirty="0"/>
+              <a:t>トピック・センテンスは各パラグラフに１つある</a:t>
+            </a:r>
+            <a:endParaRPr lang="en-US" altLang="ja-JP" dirty="0"/>
           </a:p>
           <a:p>
             <a:pPr lvl="1"/>
             <a:r>
-              <a:rPr kumimoji="1" lang="ja-JP" altLang="en-US" dirty="0"/>
-              <a:t>ない場合も結構ある</a:t>
-            </a:r>
-            <a:endParaRPr kumimoji="1" lang="en-US" altLang="ja-JP" dirty="0"/>
+              <a:rPr lang="ja-JP" altLang="en-US" dirty="0"/>
+              <a:t>基本的にはそのパラグラフの先頭にある</a:t>
+            </a:r>
+            <a:endParaRPr lang="en-US" altLang="ja-JP" dirty="0"/>
+          </a:p>
+          <a:p>
+            <a:pPr lvl="2"/>
+            <a:r>
+              <a:rPr lang="ja-JP" altLang="en-US" dirty="0"/>
+              <a:t>前のパラグラフとの接続の関係で２文目等にくることもある</a:t>
+            </a:r>
+            <a:endParaRPr lang="en-US" altLang="ja-JP" dirty="0"/>
+          </a:p>
+          <a:p>
+            <a:r>
+              <a:rPr lang="ja-JP" altLang="en-US" dirty="0">
+                <a:solidFill>
+                  <a:schemeClr val="accent5"/>
+                </a:solidFill>
+              </a:rPr>
+              <a:t>各パラグラフのトピック・センテンスだけを取り出して繋げて読んでもおおよそ意味が通るようにする</a:t>
+            </a:r>
+            <a:endParaRPr lang="en-US" altLang="ja-JP" dirty="0">
+              <a:solidFill>
+                <a:schemeClr val="accent5"/>
+              </a:solidFill>
+            </a:endParaRPr>
+          </a:p>
+          <a:p>
+            <a:pPr lvl="1"/>
+            <a:r>
+              <a:rPr lang="ja-JP" altLang="en-US" dirty="0"/>
+              <a:t>トピック・センテンスはパラグラフの主張をまとめたもの</a:t>
+            </a:r>
+            <a:endParaRPr lang="en-US" altLang="ja-JP" dirty="0"/>
+          </a:p>
+          <a:p>
+            <a:pPr lvl="1"/>
+            <a:r>
+              <a:rPr lang="ja-JP" altLang="en-US" dirty="0"/>
+              <a:t>そこだけを取り出せば，おおまかな全体の主張がわかる</a:t>
+            </a:r>
+            <a:endParaRPr lang="en-US" altLang="ja-JP" dirty="0"/>
           </a:p>
         </p:txBody>
       </p:sp>
     </p:spTree>
     <p:extLst>
       <p:ext uri="{BB962C8B-B14F-4D97-AF65-F5344CB8AC3E}">
-        <p14:creationId xmlns:p14="http://schemas.microsoft.com/office/powerpoint/2010/main" val="127409624"/>
+        <p14:creationId xmlns:p14="http://schemas.microsoft.com/office/powerpoint/2010/main" val="4163540200"/>
       </p:ext>
     </p:extLst>
   </p:cSld>
@@ -3502,7 +3548,7 @@
           <p:cNvPr id="2" name="タイトル 1">
             <a:extLst>
               <a:ext uri="{FF2B5EF4-FFF2-40B4-BE49-F238E27FC236}">
-                <a16:creationId xmlns:a16="http://schemas.microsoft.com/office/drawing/2014/main" id="{D93A85F1-1B35-5F84-85D9-55D1C6172E1E}"/>
+                <a16:creationId xmlns:a16="http://schemas.microsoft.com/office/drawing/2014/main" id="{85895AA1-C3F6-5137-D327-90AEE8D8717F}"/>
               </a:ext>
             </a:extLst>
           </p:cNvPr>
@@ -3520,7 +3566,7 @@
           <a:p>
             <a:r>
               <a:rPr kumimoji="1" lang="ja-JP" altLang="en-US" dirty="0"/>
-              <a:t>「文」の書き方のポイント</a:t>
+              <a:t>サポーティング・センテンス</a:t>
             </a:r>
           </a:p>
         </p:txBody>
@@ -3530,7 +3576,7 @@
           <p:cNvPr id="3" name="テキスト プレースホルダー 2">
             <a:extLst>
               <a:ext uri="{FF2B5EF4-FFF2-40B4-BE49-F238E27FC236}">
-                <a16:creationId xmlns:a16="http://schemas.microsoft.com/office/drawing/2014/main" id="{B4414A41-3B92-4E38-46C4-3166C73733E8}"/>
+                <a16:creationId xmlns:a16="http://schemas.microsoft.com/office/drawing/2014/main" id="{AF7DC518-51F8-FA2A-0A74-B2DB18D49FC7}"/>
               </a:ext>
             </a:extLst>
           </p:cNvPr>
@@ -3546,36 +3592,53 @@
           <a:bodyPr/>
           <a:lstStyle/>
           <a:p>
-            <a:pPr marL="457200" indent="-457200">
-              <a:buFont typeface="+mj-lt"/>
-              <a:buAutoNum type="arabicPeriod"/>
-            </a:pPr>
             <a:r>
               <a:rPr kumimoji="1" lang="ja-JP" altLang="en-US" dirty="0"/>
-              <a:t>各文を短く簡潔にする</a:t>
+              <a:t>サポーティング・センテンス</a:t>
             </a:r>
             <a:endParaRPr kumimoji="1" lang="en-US" altLang="ja-JP" dirty="0"/>
           </a:p>
           <a:p>
-            <a:pPr marL="457200" indent="-457200">
-              <a:buFont typeface="+mj-lt"/>
-              <a:buAutoNum type="arabicPeriod"/>
-            </a:pPr>
+            <a:pPr lvl="1"/>
+            <a:r>
+              <a:rPr lang="ja-JP" altLang="en-US" dirty="0"/>
+              <a:t>トピック・センテンスの主張を補強するための文</a:t>
+            </a:r>
+            <a:endParaRPr lang="en-US" altLang="ja-JP" dirty="0"/>
+          </a:p>
+          <a:p>
+            <a:pPr lvl="1"/>
             <a:r>
               <a:rPr kumimoji="1" lang="ja-JP" altLang="en-US" dirty="0"/>
-              <a:t>各文の主語や動詞，述語を明確にする</a:t>
+              <a:t>各パラグラフはサポーティング・センテンスを１～複数含む</a:t>
             </a:r>
             <a:endParaRPr kumimoji="1" lang="en-US" altLang="ja-JP" dirty="0"/>
           </a:p>
           <a:p>
-            <a:pPr marL="457200" indent="-457200">
-              <a:buFont typeface="+mj-lt"/>
-              <a:buAutoNum type="arabicPeriod"/>
-            </a:pPr>
+            <a:r>
+              <a:rPr lang="ja-JP" altLang="en-US" dirty="0"/>
+              <a:t>トピック・センテンスとの関係</a:t>
+            </a:r>
+            <a:endParaRPr lang="en-US" altLang="ja-JP" dirty="0"/>
+          </a:p>
+          <a:p>
+            <a:pPr lvl="1"/>
             <a:r>
               <a:rPr kumimoji="1" lang="ja-JP" altLang="en-US" dirty="0"/>
-              <a:t>各文を適切に接続する</a:t>
-            </a:r>
+              <a:t>サポーティング・センテンスはトピック・センテンスの詳細を述べる関係にある</a:t>
+            </a:r>
+            <a:endParaRPr kumimoji="1" lang="en-US" altLang="ja-JP" dirty="0"/>
+          </a:p>
+          <a:p>
+            <a:pPr lvl="1"/>
+            <a:r>
+              <a:rPr kumimoji="1" lang="ja-JP" altLang="en-US" dirty="0"/>
+              <a:t>トピック・センテンスはサポーティング・センテンス達をまとめたものとなる</a:t>
+            </a:r>
+            <a:endParaRPr kumimoji="1" lang="en-US" altLang="ja-JP" dirty="0"/>
+          </a:p>
+          <a:p>
+            <a:pPr lvl="2"/>
             <a:endParaRPr kumimoji="1" lang="en-US" altLang="ja-JP" dirty="0"/>
           </a:p>
         </p:txBody>
@@ -3583,7 +3646,7 @@
     </p:spTree>
     <p:extLst>
       <p:ext uri="{BB962C8B-B14F-4D97-AF65-F5344CB8AC3E}">
-        <p14:creationId xmlns:p14="http://schemas.microsoft.com/office/powerpoint/2010/main" val="3057599224"/>
+        <p14:creationId xmlns:p14="http://schemas.microsoft.com/office/powerpoint/2010/main" val="1366793701"/>
       </p:ext>
     </p:extLst>
   </p:cSld>
@@ -3623,7 +3686,7 @@
           <p:cNvPr id="2" name="タイトル 1">
             <a:extLst>
               <a:ext uri="{FF2B5EF4-FFF2-40B4-BE49-F238E27FC236}">
-                <a16:creationId xmlns:a16="http://schemas.microsoft.com/office/drawing/2014/main" id="{A660BB84-DBA8-6642-6C09-5A4CA1B7E113}"/>
+                <a16:creationId xmlns:a16="http://schemas.microsoft.com/office/drawing/2014/main" id="{85895AA1-C3F6-5137-D327-90AEE8D8717F}"/>
               </a:ext>
             </a:extLst>
           </p:cNvPr>
@@ -3640,13 +3703,14 @@
           <a:lstStyle/>
           <a:p>
             <a:r>
-              <a:rPr kumimoji="1" lang="en-US" altLang="ja-JP" dirty="0"/>
-              <a:t>1. </a:t>
-            </a:r>
-            <a:r>
-              <a:rPr kumimoji="1" lang="ja-JP" altLang="en-US" dirty="0"/>
-              <a:t>各文を短く簡潔にする</a:t>
-            </a:r>
+              <a:rPr lang="ja-JP" altLang="en-US" dirty="0"/>
+              <a:t>コンクルーディング</a:t>
+            </a:r>
+            <a:r>
+              <a:rPr lang="ja-JP" altLang="en-US"/>
+              <a:t>・センテンス</a:t>
+            </a:r>
+            <a:endParaRPr kumimoji="1" lang="ja-JP" altLang="en-US" dirty="0"/>
           </a:p>
         </p:txBody>
       </p:sp>
@@ -3655,7 +3719,7 @@
           <p:cNvPr id="3" name="テキスト プレースホルダー 2">
             <a:extLst>
               <a:ext uri="{FF2B5EF4-FFF2-40B4-BE49-F238E27FC236}">
-                <a16:creationId xmlns:a16="http://schemas.microsoft.com/office/drawing/2014/main" id="{7FC8FB9F-70D9-3B50-054F-E1E6CF721F79}"/>
+                <a16:creationId xmlns:a16="http://schemas.microsoft.com/office/drawing/2014/main" id="{AF7DC518-51F8-FA2A-0A74-B2DB18D49FC7}"/>
               </a:ext>
             </a:extLst>
           </p:cNvPr>
@@ -3672,27 +3736,24 @@
           <a:lstStyle/>
           <a:p>
             <a:r>
-              <a:rPr kumimoji="1" lang="ja-JP" altLang="en-US" b="1" dirty="0">
-                <a:solidFill>
-                  <a:schemeClr val="accent5"/>
-                </a:solidFill>
-              </a:rPr>
-              <a:t>短い文は全てを解決する</a:t>
+              <a:rPr lang="ja-JP" altLang="en-US" dirty="0"/>
+              <a:t>コンクルーディング・センテンス</a:t>
+            </a:r>
+            <a:endParaRPr lang="en-US" altLang="ja-JP" dirty="0"/>
+          </a:p>
+          <a:p>
+            <a:pPr lvl="1"/>
+            <a:r>
+              <a:rPr kumimoji="1" lang="ja-JP" altLang="en-US" dirty="0"/>
+              <a:t>トピック・センテンスの内容を別の言い方でまとめたもの</a:t>
             </a:r>
             <a:endParaRPr kumimoji="1" lang="en-US" altLang="ja-JP" dirty="0"/>
           </a:p>
           <a:p>
+            <a:pPr lvl="1"/>
             <a:r>
               <a:rPr kumimoji="1" lang="ja-JP" altLang="en-US" dirty="0"/>
-              <a:t>短く簡潔な文は，</a:t>
-            </a:r>
-            <a:endParaRPr kumimoji="1" lang="en-US" altLang="ja-JP" dirty="0"/>
-          </a:p>
-          <a:p>
-            <a:pPr lvl="1"/>
-            <a:r>
-              <a:rPr kumimoji="1" lang="ja-JP" altLang="en-US" dirty="0"/>
-              <a:t>誰が読んでも明確に意味が理解できる</a:t>
+              <a:t>ない場合も結構ある</a:t>
             </a:r>
             <a:endParaRPr kumimoji="1" lang="en-US" altLang="ja-JP" dirty="0"/>
           </a:p>
@@ -3701,7 +3762,7 @@
     </p:spTree>
     <p:extLst>
       <p:ext uri="{BB962C8B-B14F-4D97-AF65-F5344CB8AC3E}">
-        <p14:creationId xmlns:p14="http://schemas.microsoft.com/office/powerpoint/2010/main" val="1822019107"/>
+        <p14:creationId xmlns:p14="http://schemas.microsoft.com/office/powerpoint/2010/main" val="127409624"/>
       </p:ext>
     </p:extLst>
   </p:cSld>
@@ -3738,10 +3799,10 @@
       </p:grpSpPr>
       <p:sp>
         <p:nvSpPr>
-          <p:cNvPr id="2" name="タイトル 1">
-            <a:extLst>
-              <a:ext uri="{FF2B5EF4-FFF2-40B4-BE49-F238E27FC236}">
-                <a16:creationId xmlns:a16="http://schemas.microsoft.com/office/drawing/2014/main" id="{7015080F-9E79-6A62-8922-464CD13B906F}"/>
+          <p:cNvPr id="6" name="タイトル 5">
+            <a:extLst>
+              <a:ext uri="{FF2B5EF4-FFF2-40B4-BE49-F238E27FC236}">
+                <a16:creationId xmlns:a16="http://schemas.microsoft.com/office/drawing/2014/main" id="{D44FC4B2-BE5F-0B62-A30B-6488B98CA7F1}"/>
               </a:ext>
             </a:extLst>
           </p:cNvPr>
@@ -3758,101 +3819,23 @@
           <a:lstStyle/>
           <a:p>
             <a:r>
-              <a:rPr kumimoji="1" lang="en-US" altLang="ja-JP" dirty="0"/>
-              <a:t>2. </a:t>
-            </a:r>
-            <a:r>
-              <a:rPr kumimoji="1" lang="ja-JP" altLang="en-US" dirty="0"/>
-              <a:t>各文の主語や動詞，述語を明確にする</a:t>
-            </a:r>
-          </a:p>
-        </p:txBody>
-      </p:sp>
-      <p:sp>
-        <p:nvSpPr>
-          <p:cNvPr id="3" name="テキスト プレースホルダー 2">
-            <a:extLst>
-              <a:ext uri="{FF2B5EF4-FFF2-40B4-BE49-F238E27FC236}">
-                <a16:creationId xmlns:a16="http://schemas.microsoft.com/office/drawing/2014/main" id="{CFBEEDD7-1ABB-B544-39E1-C52AB828F23A}"/>
-              </a:ext>
-            </a:extLst>
-          </p:cNvPr>
-          <p:cNvSpPr>
-            <a:spLocks noGrp="1"/>
-          </p:cNvSpPr>
-          <p:nvPr>
-            <p:ph type="body" sz="quarter" idx="10"/>
-          </p:nvPr>
-        </p:nvSpPr>
-        <p:spPr/>
-        <p:txBody>
-          <a:bodyPr/>
-          <a:lstStyle/>
-          <a:p>
-            <a:r>
-              <a:rPr kumimoji="1" lang="ja-JP" altLang="en-US" dirty="0"/>
-              <a:t>日本語は主語や述語（目的語）を省略して書けてしまう</a:t>
-            </a:r>
-            <a:endParaRPr kumimoji="1" lang="en-US" altLang="ja-JP" dirty="0"/>
-          </a:p>
-          <a:p>
-            <a:pPr lvl="1"/>
-            <a:r>
-              <a:rPr kumimoji="1" lang="ja-JP" altLang="en-US" dirty="0"/>
-              <a:t>日本語論文であっても，本来そのような曖昧さは排除すべき</a:t>
-            </a:r>
-            <a:endParaRPr kumimoji="1" lang="en-US" altLang="ja-JP" dirty="0"/>
-          </a:p>
-          <a:p>
-            <a:pPr lvl="1"/>
-            <a:r>
-              <a:rPr kumimoji="1" lang="ja-JP" altLang="en-US" dirty="0"/>
-              <a:t>多少冗長であっても，意味に紛れがないよう略さずにきちんと書くべき</a:t>
-            </a:r>
-            <a:endParaRPr kumimoji="1" lang="en-US" altLang="ja-JP" dirty="0"/>
-          </a:p>
-          <a:p>
-            <a:r>
-              <a:rPr kumimoji="1" lang="ja-JP" altLang="en-US" dirty="0">
-                <a:solidFill>
-                  <a:schemeClr val="accent5"/>
-                </a:solidFill>
-              </a:rPr>
-              <a:t>まず各文を確認して，主語や述語が欠けていないかを確認</a:t>
-            </a:r>
-            <a:endParaRPr kumimoji="1" lang="en-US" altLang="ja-JP" dirty="0">
-              <a:solidFill>
-                <a:schemeClr val="accent5"/>
-              </a:solidFill>
-            </a:endParaRPr>
-          </a:p>
-          <a:p>
-            <a:pPr lvl="1"/>
-            <a:r>
-              <a:rPr kumimoji="1" lang="ja-JP" altLang="en-US" dirty="0"/>
-              <a:t>自明な場合でも「それ」などを使った方がよい</a:t>
-            </a:r>
+              <a:rPr lang="ja-JP" altLang="en-US" dirty="0"/>
+              <a:t>文</a:t>
+            </a:r>
+            <a:endParaRPr lang="en-US" dirty="0"/>
           </a:p>
         </p:txBody>
       </p:sp>
     </p:spTree>
     <p:extLst>
       <p:ext uri="{BB962C8B-B14F-4D97-AF65-F5344CB8AC3E}">
-        <p14:creationId xmlns:p14="http://schemas.microsoft.com/office/powerpoint/2010/main" val="902104713"/>
+        <p14:creationId xmlns:p14="http://schemas.microsoft.com/office/powerpoint/2010/main" val="2493814936"/>
       </p:ext>
     </p:extLst>
   </p:cSld>
   <p:clrMapOvr>
     <a:masterClrMapping/>
   </p:clrMapOvr>
-  <mc:AlternateContent xmlns:mc="http://schemas.openxmlformats.org/markup-compatibility/2006" xmlns:p14="http://schemas.microsoft.com/office/powerpoint/2010/main">
-    <mc:Choice Requires="p14">
-      <p:transition p14:dur="10"/>
-    </mc:Choice>
-    <mc:Fallback xmlns="">
-      <p:transition/>
-    </mc:Fallback>
-  </mc:AlternateContent>
 </p:sld>
 </file>
 
@@ -3878,7 +3861,7 @@
           <p:cNvPr id="2" name="タイトル 1">
             <a:extLst>
               <a:ext uri="{FF2B5EF4-FFF2-40B4-BE49-F238E27FC236}">
-                <a16:creationId xmlns:a16="http://schemas.microsoft.com/office/drawing/2014/main" id="{91D89DC0-3FD1-AEAA-2E43-17FD95F7ABA3}"/>
+                <a16:creationId xmlns:a16="http://schemas.microsoft.com/office/drawing/2014/main" id="{D93A85F1-1B35-5F84-85D9-55D1C6172E1E}"/>
               </a:ext>
             </a:extLst>
           </p:cNvPr>
@@ -3895,12 +3878,8 @@
           <a:lstStyle/>
           <a:p>
             <a:r>
-              <a:rPr kumimoji="1" lang="en-US" altLang="ja-JP" dirty="0"/>
-              <a:t>3. </a:t>
-            </a:r>
-            <a:r>
               <a:rPr kumimoji="1" lang="ja-JP" altLang="en-US" dirty="0"/>
-              <a:t>各文を適切に接続する</a:t>
+              <a:t>「文」の書き方のポイント</a:t>
             </a:r>
           </a:p>
         </p:txBody>
@@ -3910,7 +3889,7 @@
           <p:cNvPr id="3" name="テキスト プレースホルダー 2">
             <a:extLst>
               <a:ext uri="{FF2B5EF4-FFF2-40B4-BE49-F238E27FC236}">
-                <a16:creationId xmlns:a16="http://schemas.microsoft.com/office/drawing/2014/main" id="{5BC3025A-7B01-BA2E-4B61-9B87B1743DAB}"/>
+                <a16:creationId xmlns:a16="http://schemas.microsoft.com/office/drawing/2014/main" id="{B4414A41-3B92-4E38-46C4-3166C73733E8}"/>
               </a:ext>
             </a:extLst>
           </p:cNvPr>
@@ -3926,77 +3905,24 @@
           <a:bodyPr/>
           <a:lstStyle/>
           <a:p>
-            <a:r>
-              <a:rPr kumimoji="1" lang="ja-JP" altLang="en-US" dirty="0"/>
-              <a:t>なにも考えずに文を短くするとぶつ切れになる</a:t>
-            </a:r>
-            <a:endParaRPr kumimoji="1" lang="en-US" altLang="ja-JP" dirty="0"/>
-          </a:p>
-          <a:p>
-            <a:pPr lvl="1"/>
-            <a:r>
-              <a:rPr kumimoji="1" lang="ja-JP" altLang="en-US" dirty="0"/>
-              <a:t>元々なんとなく繋がっていた気がしていただけで，</a:t>
-            </a:r>
-            <a:br>
-              <a:rPr kumimoji="1" lang="en-US" altLang="ja-JP" dirty="0"/>
-            </a:br>
-            <a:r>
-              <a:rPr kumimoji="1" lang="ja-JP" altLang="en-US" dirty="0"/>
-              <a:t>実は論理的に接続されていないとこうなりがち</a:t>
-            </a:r>
-            <a:endParaRPr kumimoji="1" lang="en-US" altLang="ja-JP" dirty="0"/>
-          </a:p>
-          <a:p>
-            <a:r>
-              <a:rPr kumimoji="1" lang="ja-JP" altLang="en-US" dirty="0"/>
-              <a:t>文同士を接続する方法</a:t>
-            </a:r>
-            <a:endParaRPr kumimoji="1" lang="en-US" altLang="ja-JP" dirty="0"/>
-          </a:p>
-          <a:p>
-            <a:pPr marL="817200" lvl="1" indent="-457200">
+            <a:pPr marL="457200" indent="-457200">
               <a:buFont typeface="+mj-lt"/>
               <a:buAutoNum type="arabicPeriod"/>
             </a:pPr>
             <a:r>
               <a:rPr kumimoji="1" lang="ja-JP" altLang="en-US" dirty="0"/>
-              <a:t>接続詞を適切に入れる</a:t>
+              <a:t>各文を短く簡潔にする</a:t>
             </a:r>
             <a:endParaRPr kumimoji="1" lang="en-US" altLang="ja-JP" dirty="0"/>
           </a:p>
           <a:p>
-            <a:pPr lvl="2"/>
-            <a:r>
-              <a:rPr kumimoji="1" lang="ja-JP" altLang="en-US" dirty="0"/>
-              <a:t>「したがって」</a:t>
-            </a:r>
-            <a:endParaRPr kumimoji="1" lang="en-US" altLang="ja-JP" dirty="0"/>
-          </a:p>
-          <a:p>
-            <a:pPr lvl="2"/>
-            <a:r>
-              <a:rPr kumimoji="1" lang="ja-JP" altLang="en-US" dirty="0"/>
-              <a:t>「なぜなら」</a:t>
-            </a:r>
-            <a:endParaRPr kumimoji="1" lang="en-US" altLang="ja-JP" dirty="0"/>
-          </a:p>
-          <a:p>
-            <a:pPr lvl="2"/>
-            <a:r>
-              <a:rPr kumimoji="1" lang="ja-JP" altLang="en-US" dirty="0"/>
-              <a:t>「しかし」</a:t>
-            </a:r>
-            <a:endParaRPr kumimoji="1" lang="en-US" altLang="ja-JP" dirty="0"/>
-          </a:p>
-          <a:p>
-            <a:pPr marL="817200" lvl="1" indent="-457200">
+            <a:pPr marL="457200" indent="-457200">
               <a:buFont typeface="+mj-lt"/>
               <a:buAutoNum type="arabicPeriod"/>
             </a:pPr>
             <a:r>
               <a:rPr kumimoji="1" lang="ja-JP" altLang="en-US" dirty="0"/>
-              <a:t>文内の論理的な繋がりを使う</a:t>
+              <a:t>各文の主語や動詞，述語を明確にする</a:t>
             </a:r>
             <a:endParaRPr kumimoji="1" lang="en-US" altLang="ja-JP" dirty="0"/>
           </a:p>
@@ -4005,7 +3931,7 @@
     </p:spTree>
     <p:extLst>
       <p:ext uri="{BB962C8B-B14F-4D97-AF65-F5344CB8AC3E}">
-        <p14:creationId xmlns:p14="http://schemas.microsoft.com/office/powerpoint/2010/main" val="308663371"/>
+        <p14:creationId xmlns:p14="http://schemas.microsoft.com/office/powerpoint/2010/main" val="3057599224"/>
       </p:ext>
     </p:extLst>
   </p:cSld>
@@ -4045,7 +3971,7 @@
           <p:cNvPr id="2" name="タイトル 1">
             <a:extLst>
               <a:ext uri="{FF2B5EF4-FFF2-40B4-BE49-F238E27FC236}">
-                <a16:creationId xmlns:a16="http://schemas.microsoft.com/office/drawing/2014/main" id="{0AA3E805-C8B0-4B62-0EE7-64CFD041C187}"/>
+                <a16:creationId xmlns:a16="http://schemas.microsoft.com/office/drawing/2014/main" id="{A660BB84-DBA8-6642-6C09-5A4CA1B7E113}"/>
               </a:ext>
             </a:extLst>
           </p:cNvPr>
@@ -4062,8 +3988,12 @@
           <a:lstStyle/>
           <a:p>
             <a:r>
+              <a:rPr kumimoji="1" lang="en-US" altLang="ja-JP" dirty="0"/>
+              <a:t>1. </a:t>
+            </a:r>
+            <a:r>
               <a:rPr kumimoji="1" lang="ja-JP" altLang="en-US" dirty="0"/>
-              <a:t>論理的な繋がりを使った文の接続１</a:t>
+              <a:t>各文を短く簡潔にする</a:t>
             </a:r>
           </a:p>
         </p:txBody>
@@ -4073,7 +4003,7 @@
           <p:cNvPr id="3" name="テキスト プレースホルダー 2">
             <a:extLst>
               <a:ext uri="{FF2B5EF4-FFF2-40B4-BE49-F238E27FC236}">
-                <a16:creationId xmlns:a16="http://schemas.microsoft.com/office/drawing/2014/main" id="{60ADC020-2198-50F1-6F94-34B8CBB0F2D4}"/>
+                <a16:creationId xmlns:a16="http://schemas.microsoft.com/office/drawing/2014/main" id="{7FC8FB9F-70D9-3B50-054F-E1E6CF721F79}"/>
               </a:ext>
             </a:extLst>
           </p:cNvPr>
@@ -4090,172 +4020,36 @@
           <a:lstStyle/>
           <a:p>
             <a:r>
-              <a:rPr kumimoji="1" lang="ja-JP" altLang="en-US" sz="1800" dirty="0">
+              <a:rPr kumimoji="1" lang="ja-JP" altLang="en-US" b="1" dirty="0">
                 <a:solidFill>
                   <a:schemeClr val="accent5"/>
                 </a:solidFill>
               </a:rPr>
-              <a:t>そこより前の文に出てくる単語や事象を入れると自然に繋がる</a:t>
-            </a:r>
-            <a:endParaRPr kumimoji="1" lang="en-US" altLang="ja-JP" sz="1800" dirty="0">
-              <a:solidFill>
-                <a:schemeClr val="accent5"/>
-              </a:solidFill>
-            </a:endParaRPr>
+              <a:t>短い文は全てを解決する</a:t>
+            </a:r>
+            <a:endParaRPr kumimoji="1" lang="en-US" altLang="ja-JP" dirty="0"/>
+          </a:p>
+          <a:p>
+            <a:r>
+              <a:rPr kumimoji="1" lang="ja-JP" altLang="en-US" dirty="0"/>
+              <a:t>短く簡潔な文は，</a:t>
+            </a:r>
+            <a:endParaRPr kumimoji="1" lang="en-US" altLang="ja-JP" dirty="0"/>
           </a:p>
           <a:p>
             <a:pPr lvl="1"/>
             <a:r>
-              <a:rPr kumimoji="1" lang="ja-JP" altLang="en-US" sz="1800" dirty="0"/>
-              <a:t>そこまでの文の内容に新しい情報を付け足す形にする</a:t>
-            </a:r>
-            <a:endParaRPr kumimoji="1" lang="en-US" altLang="ja-JP" sz="1800" dirty="0"/>
-          </a:p>
-          <a:p>
-            <a:r>
-              <a:rPr kumimoji="1" lang="ja-JP" altLang="en-US" sz="1800" dirty="0"/>
-              <a:t>「</a:t>
-            </a:r>
-            <a:r>
-              <a:rPr kumimoji="1" lang="en-US" altLang="ja-JP" sz="1800" dirty="0"/>
-              <a:t>A </a:t>
-            </a:r>
-            <a:r>
-              <a:rPr kumimoji="1" lang="ja-JP" altLang="en-US" sz="1800" dirty="0"/>
-              <a:t>は </a:t>
-            </a:r>
-            <a:r>
-              <a:rPr kumimoji="1" lang="en-US" altLang="ja-JP" sz="1800" dirty="0"/>
-              <a:t>B </a:t>
-            </a:r>
-            <a:r>
-              <a:rPr kumimoji="1" lang="ja-JP" altLang="en-US" sz="1800" dirty="0"/>
-              <a:t>である．なぜなら </a:t>
-            </a:r>
-            <a:r>
-              <a:rPr lang="en-US" altLang="ja-JP" sz="1800" dirty="0"/>
-              <a:t>B </a:t>
-            </a:r>
-            <a:r>
-              <a:rPr lang="ja-JP" altLang="en-US" sz="1800" dirty="0"/>
-              <a:t>は </a:t>
-            </a:r>
-            <a:r>
-              <a:rPr lang="en-US" altLang="ja-JP" sz="1800" dirty="0"/>
-              <a:t>C </a:t>
-            </a:r>
-            <a:r>
-              <a:rPr lang="ja-JP" altLang="en-US" sz="1800" dirty="0"/>
-              <a:t>だからだ</a:t>
-            </a:r>
-            <a:r>
-              <a:rPr kumimoji="1" lang="ja-JP" altLang="en-US" sz="1800" dirty="0"/>
-              <a:t>」の後に繋げる文を考える</a:t>
-            </a:r>
-            <a:endParaRPr kumimoji="1" lang="en-US" altLang="ja-JP" sz="1800" dirty="0"/>
-          </a:p>
-          <a:p>
-            <a:pPr lvl="1"/>
-            <a:r>
-              <a:rPr kumimoji="1" lang="ja-JP" altLang="en-US" sz="1800" dirty="0"/>
-              <a:t>良い例：</a:t>
-            </a:r>
-            <a:endParaRPr kumimoji="1" lang="en-US" altLang="ja-JP" sz="1800" dirty="0"/>
-          </a:p>
-          <a:p>
-            <a:pPr lvl="2"/>
-            <a:r>
-              <a:rPr kumimoji="1" lang="ja-JP" altLang="en-US" sz="1800" dirty="0"/>
-              <a:t>「この </a:t>
-            </a:r>
-            <a:r>
-              <a:rPr kumimoji="1" lang="en-US" altLang="ja-JP" sz="1800" dirty="0"/>
-              <a:t>B </a:t>
-            </a:r>
-            <a:r>
-              <a:rPr kumimoji="1" lang="ja-JP" altLang="en-US" sz="1800" dirty="0"/>
-              <a:t>は～という性質をもつ」</a:t>
-            </a:r>
-            <a:endParaRPr kumimoji="1" lang="en-US" altLang="ja-JP" sz="1800" dirty="0"/>
-          </a:p>
-          <a:p>
-            <a:pPr lvl="2"/>
-            <a:r>
-              <a:rPr kumimoji="1" lang="ja-JP" altLang="en-US" sz="1800" dirty="0"/>
-              <a:t>「この </a:t>
-            </a:r>
-            <a:r>
-              <a:rPr kumimoji="1" lang="en-US" altLang="ja-JP" sz="1800" dirty="0"/>
-              <a:t>C </a:t>
-            </a:r>
-            <a:r>
-              <a:rPr kumimoji="1" lang="ja-JP" altLang="en-US" sz="1800" dirty="0"/>
-              <a:t>は一般に </a:t>
-            </a:r>
-            <a:r>
-              <a:rPr kumimoji="1" lang="en-US" altLang="ja-JP" sz="1800" dirty="0"/>
-              <a:t>D </a:t>
-            </a:r>
-            <a:r>
-              <a:rPr kumimoji="1" lang="ja-JP" altLang="en-US" sz="1800" dirty="0"/>
-              <a:t>である」</a:t>
-            </a:r>
-            <a:endParaRPr kumimoji="1" lang="en-US" altLang="ja-JP" sz="1800" dirty="0"/>
-          </a:p>
-          <a:p>
-            <a:pPr lvl="1"/>
-            <a:r>
-              <a:rPr kumimoji="1" lang="ja-JP" altLang="en-US" sz="1800" dirty="0"/>
-              <a:t>だめな例：</a:t>
-            </a:r>
-            <a:endParaRPr kumimoji="1" lang="en-US" altLang="ja-JP" sz="1800" dirty="0"/>
-          </a:p>
-          <a:p>
-            <a:pPr lvl="2"/>
-            <a:r>
-              <a:rPr kumimoji="1" lang="ja-JP" altLang="en-US" sz="1800" dirty="0"/>
-              <a:t>「</a:t>
-            </a:r>
-            <a:r>
-              <a:rPr kumimoji="1" lang="en-US" altLang="ja-JP" sz="1800" dirty="0"/>
-              <a:t>E </a:t>
-            </a:r>
-            <a:r>
-              <a:rPr kumimoji="1" lang="ja-JP" altLang="en-US" sz="1800" dirty="0"/>
-              <a:t>は </a:t>
-            </a:r>
-            <a:r>
-              <a:rPr kumimoji="1" lang="en-US" altLang="ja-JP" sz="1800" dirty="0"/>
-              <a:t>F </a:t>
-            </a:r>
-            <a:r>
-              <a:rPr kumimoji="1" lang="ja-JP" altLang="en-US" sz="1800" dirty="0"/>
-              <a:t>である」（</a:t>
-            </a:r>
-            <a:r>
-              <a:rPr kumimoji="1" lang="en-US" altLang="ja-JP" sz="1800" dirty="0"/>
-              <a:t>E </a:t>
-            </a:r>
-            <a:r>
-              <a:rPr kumimoji="1" lang="ja-JP" altLang="en-US" sz="1800" dirty="0"/>
-              <a:t>も </a:t>
-            </a:r>
-            <a:r>
-              <a:rPr kumimoji="1" lang="en-US" altLang="ja-JP" sz="1800" dirty="0"/>
-              <a:t>F </a:t>
-            </a:r>
-            <a:r>
-              <a:rPr kumimoji="1" lang="ja-JP" altLang="en-US" sz="1800" dirty="0"/>
-              <a:t>も初登場なので繋がってない）</a:t>
-            </a:r>
-            <a:endParaRPr kumimoji="1" lang="en-US" altLang="ja-JP" sz="1800" dirty="0"/>
+              <a:rPr kumimoji="1" lang="ja-JP" altLang="en-US" dirty="0"/>
+              <a:t>誰が読んでも明確に意味が理解できる</a:t>
+            </a:r>
+            <a:endParaRPr kumimoji="1" lang="en-US" altLang="ja-JP" dirty="0"/>
           </a:p>
         </p:txBody>
       </p:sp>
     </p:spTree>
     <p:extLst>
       <p:ext uri="{BB962C8B-B14F-4D97-AF65-F5344CB8AC3E}">
-        <p14:creationId xmlns:p14="http://schemas.microsoft.com/office/powerpoint/2010/main" val="1530409555"/>
+        <p14:creationId xmlns:p14="http://schemas.microsoft.com/office/powerpoint/2010/main" val="1822019107"/>
       </p:ext>
     </p:extLst>
   </p:cSld>
@@ -4295,7 +4089,7 @@
           <p:cNvPr id="2" name="タイトル 1">
             <a:extLst>
               <a:ext uri="{FF2B5EF4-FFF2-40B4-BE49-F238E27FC236}">
-                <a16:creationId xmlns:a16="http://schemas.microsoft.com/office/drawing/2014/main" id="{0AA3E805-C8B0-4B62-0EE7-64CFD041C187}"/>
+                <a16:creationId xmlns:a16="http://schemas.microsoft.com/office/drawing/2014/main" id="{7015080F-9E79-6A62-8922-464CD13B906F}"/>
               </a:ext>
             </a:extLst>
           </p:cNvPr>
@@ -4312,8 +4106,12 @@
           <a:lstStyle/>
           <a:p>
             <a:r>
+              <a:rPr kumimoji="1" lang="en-US" altLang="ja-JP" dirty="0"/>
+              <a:t>2. </a:t>
+            </a:r>
+            <a:r>
               <a:rPr kumimoji="1" lang="ja-JP" altLang="en-US" dirty="0"/>
-              <a:t>論理的な繋がりを使った文の接続２</a:t>
+              <a:t>各文の主語や動詞，述語を明確にする</a:t>
             </a:r>
           </a:p>
         </p:txBody>
@@ -4323,7 +4121,7 @@
           <p:cNvPr id="3" name="テキスト プレースホルダー 2">
             <a:extLst>
               <a:ext uri="{FF2B5EF4-FFF2-40B4-BE49-F238E27FC236}">
-                <a16:creationId xmlns:a16="http://schemas.microsoft.com/office/drawing/2014/main" id="{60ADC020-2198-50F1-6F94-34B8CBB0F2D4}"/>
+                <a16:creationId xmlns:a16="http://schemas.microsoft.com/office/drawing/2014/main" id="{CFBEEDD7-1ABB-B544-39E1-C52AB828F23A}"/>
               </a:ext>
             </a:extLst>
           </p:cNvPr>
@@ -4340,164 +4138,55 @@
           <a:lstStyle/>
           <a:p>
             <a:r>
-              <a:rPr kumimoji="1" lang="ja-JP" altLang="en-US" sz="1800" dirty="0">
+              <a:rPr kumimoji="1" lang="ja-JP" altLang="en-US" dirty="0"/>
+              <a:t>日本語は主語や述語（目的語）を省略して書けてしまう</a:t>
+            </a:r>
+            <a:endParaRPr kumimoji="1" lang="en-US" altLang="ja-JP" dirty="0"/>
+          </a:p>
+          <a:p>
+            <a:pPr lvl="1"/>
+            <a:r>
+              <a:rPr kumimoji="1" lang="ja-JP" altLang="en-US" dirty="0"/>
+              <a:t>日本語論文であっても，本来そのような曖昧さは排除すべき</a:t>
+            </a:r>
+            <a:endParaRPr kumimoji="1" lang="en-US" altLang="ja-JP" dirty="0"/>
+          </a:p>
+          <a:p>
+            <a:pPr lvl="1"/>
+            <a:r>
+              <a:rPr kumimoji="1" lang="ja-JP" altLang="en-US" dirty="0"/>
+              <a:t>多少冗長であっても，意味に紛れがないよう略さずにきちんと書くべき</a:t>
+            </a:r>
+            <a:endParaRPr kumimoji="1" lang="en-US" altLang="ja-JP" dirty="0"/>
+          </a:p>
+          <a:p>
+            <a:r>
+              <a:rPr kumimoji="1" lang="ja-JP" altLang="en-US" dirty="0">
                 <a:solidFill>
                   <a:schemeClr val="accent5"/>
                 </a:solidFill>
               </a:rPr>
-              <a:t>各文内の前の方に，（なるべく近くの）既出の単語や事象を置く</a:t>
-            </a:r>
-            <a:endParaRPr kumimoji="1" lang="en-US" altLang="ja-JP" sz="1800" dirty="0"/>
+              <a:t>まず各文を確認して，主語や述語が欠けていないかを確認</a:t>
+            </a:r>
+            <a:endParaRPr kumimoji="1" lang="en-US" altLang="ja-JP" dirty="0">
+              <a:solidFill>
+                <a:schemeClr val="accent5"/>
+              </a:solidFill>
+            </a:endParaRPr>
           </a:p>
           <a:p>
             <a:pPr lvl="1"/>
             <a:r>
-              <a:rPr kumimoji="1" lang="ja-JP" altLang="en-US" sz="1800" dirty="0"/>
-              <a:t>既出の単語が，長い文の後半で初めて出てくるのは良くない</a:t>
-            </a:r>
-            <a:endParaRPr kumimoji="1" lang="en-US" altLang="ja-JP" sz="1800" dirty="0"/>
-          </a:p>
-          <a:p>
-            <a:pPr lvl="1"/>
-            <a:r>
-              <a:rPr kumimoji="1" lang="ja-JP" altLang="en-US" sz="1800" dirty="0"/>
-              <a:t>その文を最後まで読まないと，接続関係がわからない</a:t>
-            </a:r>
-            <a:endParaRPr kumimoji="1" lang="en-US" altLang="ja-JP" sz="1800" dirty="0"/>
-          </a:p>
-          <a:p>
-            <a:r>
-              <a:rPr kumimoji="1" lang="ja-JP" altLang="en-US" sz="1800" dirty="0"/>
-              <a:t>また「</a:t>
-            </a:r>
-            <a:r>
-              <a:rPr kumimoji="1" lang="en-US" altLang="ja-JP" sz="1800" dirty="0"/>
-              <a:t>A </a:t>
-            </a:r>
-            <a:r>
-              <a:rPr kumimoji="1" lang="ja-JP" altLang="en-US" sz="1800" dirty="0"/>
-              <a:t>は </a:t>
-            </a:r>
-            <a:r>
-              <a:rPr kumimoji="1" lang="en-US" altLang="ja-JP" sz="1800" dirty="0"/>
-              <a:t>B </a:t>
-            </a:r>
-            <a:r>
-              <a:rPr kumimoji="1" lang="ja-JP" altLang="en-US" sz="1800" dirty="0"/>
-              <a:t>である．なぜなら </a:t>
-            </a:r>
-            <a:r>
-              <a:rPr lang="en-US" altLang="ja-JP" sz="1800" dirty="0"/>
-              <a:t>B </a:t>
-            </a:r>
-            <a:r>
-              <a:rPr lang="ja-JP" altLang="en-US" sz="1800" dirty="0"/>
-              <a:t>は </a:t>
-            </a:r>
-            <a:r>
-              <a:rPr lang="en-US" altLang="ja-JP" sz="1800" b="1" dirty="0">
-                <a:solidFill>
-                  <a:schemeClr val="accent5"/>
-                </a:solidFill>
-              </a:rPr>
-              <a:t>C</a:t>
-            </a:r>
-            <a:r>
-              <a:rPr lang="en-US" altLang="ja-JP" sz="1800" dirty="0"/>
-              <a:t> </a:t>
-            </a:r>
-            <a:r>
-              <a:rPr lang="ja-JP" altLang="en-US" sz="1800" dirty="0"/>
-              <a:t>だからだ</a:t>
-            </a:r>
-            <a:r>
-              <a:rPr kumimoji="1" lang="ja-JP" altLang="en-US" sz="1800" dirty="0"/>
-              <a:t>」の後に繋げる文を考える</a:t>
-            </a:r>
-            <a:endParaRPr kumimoji="1" lang="en-US" altLang="ja-JP" sz="1800" dirty="0"/>
-          </a:p>
-          <a:p>
-            <a:pPr lvl="1"/>
-            <a:r>
-              <a:rPr kumimoji="1" lang="ja-JP" altLang="en-US" sz="1800" dirty="0"/>
-              <a:t>だめな例：</a:t>
-            </a:r>
-            <a:endParaRPr kumimoji="1" lang="en-US" altLang="ja-JP" sz="1800" dirty="0"/>
-          </a:p>
-          <a:p>
-            <a:pPr lvl="2"/>
-            <a:r>
-              <a:rPr kumimoji="1" lang="ja-JP" altLang="en-US" sz="1800" dirty="0"/>
-              <a:t>「～は～であり，そのため～は </a:t>
-            </a:r>
-            <a:r>
-              <a:rPr kumimoji="1" lang="en-US" altLang="ja-JP" sz="1800" b="1" dirty="0">
-                <a:solidFill>
-                  <a:schemeClr val="accent5"/>
-                </a:solidFill>
-              </a:rPr>
-              <a:t>C</a:t>
-            </a:r>
-            <a:r>
-              <a:rPr kumimoji="1" lang="en-US" altLang="ja-JP" sz="1800" dirty="0"/>
-              <a:t> </a:t>
-            </a:r>
-            <a:r>
-              <a:rPr kumimoji="1" lang="ja-JP" altLang="en-US" sz="1800" dirty="0"/>
-              <a:t>である」</a:t>
-            </a:r>
-            <a:endParaRPr kumimoji="1" lang="en-US" altLang="ja-JP" sz="1800" dirty="0"/>
-          </a:p>
-          <a:p>
-            <a:pPr lvl="2"/>
-            <a:r>
-              <a:rPr kumimoji="1" lang="en-US" altLang="ja-JP" sz="1800" dirty="0"/>
-              <a:t>C </a:t>
-            </a:r>
-            <a:r>
-              <a:rPr kumimoji="1" lang="ja-JP" altLang="en-US" sz="1800" dirty="0"/>
-              <a:t>が最後に出てくるので，そこまで読まないと関係がわからない</a:t>
-            </a:r>
-            <a:endParaRPr kumimoji="1" lang="en-US" altLang="ja-JP" sz="1800" dirty="0"/>
-          </a:p>
-          <a:p>
-            <a:pPr lvl="1"/>
-            <a:r>
-              <a:rPr kumimoji="1" lang="ja-JP" altLang="en-US" sz="1800" dirty="0"/>
-              <a:t>良い例：</a:t>
-            </a:r>
-            <a:endParaRPr kumimoji="1" lang="en-US" altLang="ja-JP" sz="1800" dirty="0"/>
-          </a:p>
-          <a:p>
-            <a:pPr lvl="2"/>
-            <a:r>
-              <a:rPr kumimoji="1" lang="ja-JP" altLang="en-US" sz="1800" dirty="0"/>
-              <a:t>「～は </a:t>
-            </a:r>
-            <a:r>
-              <a:rPr kumimoji="1" lang="en-US" altLang="ja-JP" sz="1800" b="1" dirty="0">
-                <a:solidFill>
-                  <a:schemeClr val="accent5"/>
-                </a:solidFill>
-              </a:rPr>
-              <a:t>C</a:t>
-            </a:r>
-            <a:r>
-              <a:rPr kumimoji="1" lang="en-US" altLang="ja-JP" sz="1800" dirty="0"/>
-              <a:t> </a:t>
-            </a:r>
-            <a:r>
-              <a:rPr kumimoji="1" lang="ja-JP" altLang="en-US" sz="1800" dirty="0"/>
-              <a:t>である．なぜなら～は～であるためである」</a:t>
-            </a:r>
-            <a:endParaRPr kumimoji="1" lang="en-US" altLang="ja-JP" sz="1800" dirty="0"/>
+              <a:rPr kumimoji="1" lang="ja-JP" altLang="en-US" dirty="0"/>
+              <a:t>自明な場合でも「それ」などを使った方がよい</a:t>
+            </a:r>
           </a:p>
         </p:txBody>
       </p:sp>
     </p:spTree>
     <p:extLst>
       <p:ext uri="{BB962C8B-B14F-4D97-AF65-F5344CB8AC3E}">
-        <p14:creationId xmlns:p14="http://schemas.microsoft.com/office/powerpoint/2010/main" val="3414039066"/>
+        <p14:creationId xmlns:p14="http://schemas.microsoft.com/office/powerpoint/2010/main" val="902104713"/>
       </p:ext>
     </p:extLst>
   </p:cSld>
@@ -4534,10 +4223,10 @@
       </p:grpSpPr>
       <p:sp>
         <p:nvSpPr>
-          <p:cNvPr id="2" name="タイトル 1">
-            <a:extLst>
-              <a:ext uri="{FF2B5EF4-FFF2-40B4-BE49-F238E27FC236}">
-                <a16:creationId xmlns:a16="http://schemas.microsoft.com/office/drawing/2014/main" id="{97F43A36-1241-4642-C35D-F2423024AF7E}"/>
+          <p:cNvPr id="6" name="タイトル 5">
+            <a:extLst>
+              <a:ext uri="{FF2B5EF4-FFF2-40B4-BE49-F238E27FC236}">
+                <a16:creationId xmlns:a16="http://schemas.microsoft.com/office/drawing/2014/main" id="{D44FC4B2-BE5F-0B62-A30B-6488B98CA7F1}"/>
               </a:ext>
             </a:extLst>
           </p:cNvPr>
@@ -4554,217 +4243,23 @@
           <a:lstStyle/>
           <a:p>
             <a:r>
-              <a:rPr kumimoji="1" lang="ja-JP" altLang="en-US" dirty="0"/>
-              <a:t>論理的な繋がりを使った文の接続３</a:t>
-            </a:r>
-          </a:p>
-        </p:txBody>
-      </p:sp>
-      <p:sp>
-        <p:nvSpPr>
-          <p:cNvPr id="3" name="テキスト プレースホルダー 2">
-            <a:extLst>
-              <a:ext uri="{FF2B5EF4-FFF2-40B4-BE49-F238E27FC236}">
-                <a16:creationId xmlns:a16="http://schemas.microsoft.com/office/drawing/2014/main" id="{0AE5F184-FC3A-2542-0079-3B39E1BBBD63}"/>
-              </a:ext>
-            </a:extLst>
-          </p:cNvPr>
-          <p:cNvSpPr>
-            <a:spLocks noGrp="1"/>
-          </p:cNvSpPr>
-          <p:nvPr>
-            <p:ph type="body" sz="quarter" idx="10"/>
-          </p:nvPr>
-        </p:nvSpPr>
-        <p:spPr/>
-        <p:txBody>
-          <a:bodyPr/>
-          <a:lstStyle/>
-          <a:p>
-            <a:r>
-              <a:rPr kumimoji="1" lang="ja-JP" altLang="en-US" dirty="0"/>
-              <a:t>最初に要素や単語を列挙してから，ぶらさげる</a:t>
-            </a:r>
-            <a:endParaRPr kumimoji="1" lang="en-US" altLang="ja-JP" dirty="0"/>
-          </a:p>
-          <a:p>
-            <a:pPr lvl="1"/>
-            <a:r>
-              <a:rPr kumimoji="1" lang="ja-JP" altLang="en-US" dirty="0"/>
-              <a:t>この後ろに列挙した要素の説明がくることが自然に伝わる</a:t>
-            </a:r>
-            <a:endParaRPr kumimoji="1" lang="en-US" altLang="ja-JP" dirty="0"/>
-          </a:p>
-          <a:p>
-            <a:r>
-              <a:rPr kumimoji="1" lang="ja-JP" altLang="en-US" dirty="0"/>
-              <a:t>例：</a:t>
-            </a:r>
-            <a:endParaRPr kumimoji="1" lang="en-US" altLang="ja-JP" dirty="0"/>
-          </a:p>
-          <a:p>
-            <a:pPr lvl="1"/>
-            <a:r>
-              <a:rPr kumimoji="1" lang="ja-JP" altLang="en-US" dirty="0"/>
-              <a:t>「</a:t>
-            </a:r>
-            <a:r>
-              <a:rPr kumimoji="1" lang="en-US" altLang="ja-JP" dirty="0"/>
-              <a:t>A </a:t>
-            </a:r>
-            <a:r>
-              <a:rPr kumimoji="1" lang="ja-JP" altLang="en-US" dirty="0"/>
-              <a:t>には </a:t>
-            </a:r>
-            <a:r>
-              <a:rPr kumimoji="1" lang="en-US" altLang="ja-JP" dirty="0"/>
-              <a:t>B </a:t>
-            </a:r>
-            <a:r>
-              <a:rPr kumimoji="1" lang="ja-JP" altLang="en-US" dirty="0"/>
-              <a:t>と </a:t>
-            </a:r>
-            <a:r>
-              <a:rPr kumimoji="1" lang="en-US" altLang="ja-JP" dirty="0"/>
-              <a:t>C </a:t>
-            </a:r>
-            <a:r>
-              <a:rPr kumimoji="1" lang="ja-JP" altLang="en-US" dirty="0"/>
-              <a:t>がある」</a:t>
-            </a:r>
-            <a:endParaRPr kumimoji="1" lang="en-US" altLang="ja-JP" dirty="0"/>
-          </a:p>
-          <a:p>
-            <a:pPr lvl="2"/>
-            <a:r>
-              <a:rPr kumimoji="1" lang="ja-JP" altLang="en-US" dirty="0"/>
-              <a:t>「</a:t>
-            </a:r>
-            <a:r>
-              <a:rPr kumimoji="1" lang="en-US" altLang="ja-JP" dirty="0"/>
-              <a:t>B </a:t>
-            </a:r>
-            <a:r>
-              <a:rPr kumimoji="1" lang="ja-JP" altLang="en-US" dirty="0"/>
-              <a:t>は～である」</a:t>
-            </a:r>
-            <a:endParaRPr kumimoji="1" lang="en-US" altLang="ja-JP" dirty="0"/>
-          </a:p>
-          <a:p>
-            <a:pPr lvl="2"/>
-            <a:r>
-              <a:rPr kumimoji="1" lang="ja-JP" altLang="en-US" dirty="0"/>
-              <a:t>「一方で </a:t>
-            </a:r>
-            <a:r>
-              <a:rPr kumimoji="1" lang="en-US" altLang="ja-JP" dirty="0"/>
-              <a:t>C </a:t>
-            </a:r>
-            <a:r>
-              <a:rPr kumimoji="1" lang="ja-JP" altLang="en-US" dirty="0"/>
-              <a:t>は～である」</a:t>
-            </a:r>
-            <a:br>
-              <a:rPr kumimoji="1" lang="en-US" altLang="ja-JP" dirty="0"/>
-            </a:br>
-            <a:endParaRPr kumimoji="1" lang="en-US" altLang="ja-JP" dirty="0"/>
-          </a:p>
-          <a:p>
-            <a:pPr lvl="1"/>
-            <a:r>
-              <a:rPr kumimoji="1" lang="ja-JP" altLang="en-US" dirty="0"/>
-              <a:t>「～は以下の手順で行われる」</a:t>
-            </a:r>
-            <a:endParaRPr kumimoji="1" lang="en-US" altLang="ja-JP" dirty="0"/>
-          </a:p>
-          <a:p>
-            <a:pPr lvl="2"/>
-            <a:r>
-              <a:rPr kumimoji="1" lang="ja-JP" altLang="en-US" dirty="0"/>
-              <a:t>「</a:t>
-            </a:r>
-            <a:r>
-              <a:rPr kumimoji="1" lang="en-US" altLang="ja-JP" dirty="0"/>
-              <a:t>1.</a:t>
-            </a:r>
-            <a:r>
-              <a:rPr kumimoji="1" lang="ja-JP" altLang="en-US" dirty="0"/>
-              <a:t>」「</a:t>
-            </a:r>
-            <a:r>
-              <a:rPr kumimoji="1" lang="en-US" altLang="ja-JP" dirty="0"/>
-              <a:t>2.</a:t>
-            </a:r>
-            <a:r>
-              <a:rPr kumimoji="1" lang="ja-JP" altLang="en-US" dirty="0"/>
-              <a:t>」「</a:t>
-            </a:r>
-            <a:r>
-              <a:rPr kumimoji="1" lang="en-US" altLang="ja-JP" dirty="0"/>
-              <a:t>3.</a:t>
-            </a:r>
-            <a:r>
-              <a:rPr kumimoji="1" lang="ja-JP" altLang="en-US" dirty="0"/>
-              <a:t>」</a:t>
-            </a:r>
-            <a:endParaRPr kumimoji="1" lang="en-US" altLang="ja-JP" dirty="0"/>
-          </a:p>
-          <a:p>
-            <a:pPr lvl="1"/>
-            <a:r>
-              <a:rPr kumimoji="1" lang="ja-JP" altLang="en-US" dirty="0"/>
-              <a:t>「～は以下の２つの理由からなる」</a:t>
-            </a:r>
-            <a:endParaRPr kumimoji="1" lang="en-US" altLang="ja-JP" dirty="0"/>
-          </a:p>
-          <a:p>
-            <a:pPr lvl="2"/>
-            <a:r>
-              <a:rPr kumimoji="1" lang="ja-JP" altLang="en-US" dirty="0"/>
-              <a:t>「</a:t>
-            </a:r>
-            <a:r>
-              <a:rPr kumimoji="1" lang="en-US" altLang="ja-JP" dirty="0"/>
-              <a:t>1.</a:t>
-            </a:r>
-            <a:r>
-              <a:rPr kumimoji="1" lang="ja-JP" altLang="en-US" dirty="0"/>
-              <a:t>」「</a:t>
-            </a:r>
-            <a:r>
-              <a:rPr kumimoji="1" lang="en-US" altLang="ja-JP" dirty="0"/>
-              <a:t>2.</a:t>
-            </a:r>
-            <a:r>
-              <a:rPr kumimoji="1" lang="ja-JP" altLang="en-US" dirty="0"/>
-              <a:t>」</a:t>
-            </a:r>
-            <a:endParaRPr kumimoji="1" lang="en-US" altLang="ja-JP" dirty="0"/>
-          </a:p>
-          <a:p>
-            <a:pPr lvl="1"/>
-            <a:endParaRPr kumimoji="1" lang="ja-JP" altLang="en-US" dirty="0"/>
+              <a:rPr lang="ja-JP" altLang="en-US" dirty="0"/>
+              <a:t>文の接続</a:t>
+            </a:r>
+            <a:endParaRPr lang="en-US" dirty="0"/>
           </a:p>
         </p:txBody>
       </p:sp>
     </p:spTree>
     <p:extLst>
       <p:ext uri="{BB962C8B-B14F-4D97-AF65-F5344CB8AC3E}">
-        <p14:creationId xmlns:p14="http://schemas.microsoft.com/office/powerpoint/2010/main" val="2236628389"/>
+        <p14:creationId xmlns:p14="http://schemas.microsoft.com/office/powerpoint/2010/main" val="1455509777"/>
       </p:ext>
     </p:extLst>
   </p:cSld>
   <p:clrMapOvr>
     <a:masterClrMapping/>
   </p:clrMapOvr>
-  <mc:AlternateContent xmlns:mc="http://schemas.openxmlformats.org/markup-compatibility/2006" xmlns:p14="http://schemas.microsoft.com/office/powerpoint/2010/main">
-    <mc:Choice Requires="p14">
-      <p:transition p14:dur="10"/>
-    </mc:Choice>
-    <mc:Fallback xmlns="">
-      <p:transition/>
-    </mc:Fallback>
-  </mc:AlternateContent>
 </p:sld>
 </file>
 
@@ -4808,7 +4303,7 @@
           <a:p>
             <a:r>
               <a:rPr lang="ja-JP" altLang="en-US" dirty="0"/>
-              <a:t>パラグラフや文内の接続：古い情報と新しい情報</a:t>
+              <a:t>文の接続の基本１：古い情報と新しい情報</a:t>
             </a:r>
             <a:endParaRPr kumimoji="1" lang="ja-JP" altLang="en-US" dirty="0"/>
           </a:p>
@@ -4990,7 +4485,7 @@
           <a:p>
             <a:r>
               <a:rPr lang="ja-JP" altLang="en-US" dirty="0"/>
-              <a:t>パラグラフや文内の接続：古い情報と新しい情報</a:t>
+              <a:t>文の接続の基本２：概観から詳細へ</a:t>
             </a:r>
             <a:endParaRPr kumimoji="1" lang="ja-JP" altLang="en-US" dirty="0"/>
           </a:p>
@@ -5018,32 +4513,48 @@
           <a:lstStyle/>
           <a:p>
             <a:r>
-              <a:rPr lang="ja-JP" altLang="en-US" dirty="0"/>
-              <a:t>パラグラフ内の各文</a:t>
-            </a:r>
-            <a:endParaRPr lang="en-US" altLang="ja-JP" dirty="0"/>
+              <a:rPr kumimoji="1" lang="ja-JP" altLang="en-US" dirty="0">
+                <a:solidFill>
+                  <a:schemeClr val="accent5"/>
+                </a:solidFill>
+              </a:rPr>
+              <a:t>概観を先に話してから，その詳細を次に話すのが鉄則</a:t>
+            </a:r>
+            <a:endParaRPr kumimoji="1" lang="en-US" altLang="ja-JP" dirty="0">
+              <a:solidFill>
+                <a:schemeClr val="accent5"/>
+              </a:solidFill>
+            </a:endParaRPr>
           </a:p>
           <a:p>
             <a:pPr lvl="1"/>
             <a:r>
               <a:rPr kumimoji="1" lang="ja-JP" altLang="en-US" dirty="0"/>
-              <a:t>トピック・センテンス </a:t>
-            </a:r>
-            <a:r>
-              <a:rPr kumimoji="1" lang="en-US" altLang="ja-JP" dirty="0"/>
-              <a:t>or </a:t>
-            </a:r>
+              <a:t>概観の例</a:t>
+            </a:r>
+            <a:endParaRPr kumimoji="1" lang="en-US" altLang="ja-JP" dirty="0"/>
+          </a:p>
+          <a:p>
+            <a:pPr lvl="2"/>
             <a:r>
               <a:rPr kumimoji="1" lang="ja-JP" altLang="en-US" dirty="0"/>
-              <a:t>それまでのサポーティング・センテンスで触れた内容に必ず繋がっている</a:t>
+              <a:t>おおざっぱに一言で言うとどう言う事か</a:t>
             </a:r>
             <a:endParaRPr kumimoji="1" lang="en-US" altLang="ja-JP" dirty="0"/>
           </a:p>
           <a:p>
+            <a:pPr lvl="2"/>
+            <a:r>
+              <a:rPr kumimoji="1" lang="ja-JP" altLang="en-US" dirty="0"/>
+              <a:t>なんの話題についてか</a:t>
+            </a:r>
+            <a:endParaRPr kumimoji="1" lang="en-US" altLang="ja-JP" dirty="0"/>
+          </a:p>
+          <a:p>
             <a:pPr lvl="1"/>
             <a:r>
               <a:rPr kumimoji="1" lang="ja-JP" altLang="en-US" dirty="0"/>
-              <a:t>そこまでに現れていない概念や単語だけで構成された文を入れてはいけない</a:t>
+              <a:t>詳細の例</a:t>
             </a:r>
             <a:endParaRPr kumimoji="1" lang="en-US" altLang="ja-JP" dirty="0"/>
           </a:p>
@@ -5051,15 +4562,39 @@
             <a:pPr lvl="2"/>
             <a:r>
               <a:rPr kumimoji="1" lang="ja-JP" altLang="en-US" dirty="0"/>
-              <a:t>その後まで読んではじめて意味がわかるようなものはだめ</a:t>
-            </a:r>
+              <a:t>一言で言った内容の理由や内訳など</a:t>
+            </a:r>
+            <a:endParaRPr kumimoji="1" lang="en-US" altLang="ja-JP" dirty="0"/>
+          </a:p>
+          <a:p>
+            <a:r>
+              <a:rPr kumimoji="1" lang="ja-JP" altLang="en-US" dirty="0"/>
+              <a:t>逆にしてしまいがち</a:t>
+            </a:r>
+            <a:endParaRPr kumimoji="1" lang="en-US" altLang="ja-JP" dirty="0"/>
+          </a:p>
+          <a:p>
+            <a:pPr lvl="1"/>
+            <a:r>
+              <a:rPr kumimoji="1" lang="ja-JP" altLang="en-US" dirty="0"/>
+              <a:t>逆にすると，最後まで読むと意味が繋がって わかる文になる</a:t>
+            </a:r>
+            <a:endParaRPr kumimoji="1" lang="en-US" altLang="ja-JP" dirty="0"/>
+          </a:p>
+          <a:p>
+            <a:pPr lvl="1"/>
+            <a:r>
+              <a:rPr kumimoji="1" lang="ja-JP" altLang="en-US" dirty="0"/>
+              <a:t>これは脳内に情報を全部スタックしておく必要があり，非常にわかりにくい</a:t>
+            </a:r>
+            <a:endParaRPr kumimoji="1" lang="en-US" altLang="ja-JP" dirty="0"/>
           </a:p>
         </p:txBody>
       </p:sp>
     </p:spTree>
     <p:extLst>
       <p:ext uri="{BB962C8B-B14F-4D97-AF65-F5344CB8AC3E}">
-        <p14:creationId xmlns:p14="http://schemas.microsoft.com/office/powerpoint/2010/main" val="1929943680"/>
+        <p14:creationId xmlns:p14="http://schemas.microsoft.com/office/powerpoint/2010/main" val="3682535709"/>
       </p:ext>
     </p:extLst>
   </p:cSld>
@@ -5188,10 +4723,10 @@
       </p:grpSpPr>
       <p:sp>
         <p:nvSpPr>
-          <p:cNvPr id="4" name="タイトル 3">
-            <a:extLst>
-              <a:ext uri="{FF2B5EF4-FFF2-40B4-BE49-F238E27FC236}">
-                <a16:creationId xmlns:a16="http://schemas.microsoft.com/office/drawing/2014/main" id="{6562E51A-24AB-589C-C10B-60BA2743CF86}"/>
+          <p:cNvPr id="2" name="タイトル 1">
+            <a:extLst>
+              <a:ext uri="{FF2B5EF4-FFF2-40B4-BE49-F238E27FC236}">
+                <a16:creationId xmlns:a16="http://schemas.microsoft.com/office/drawing/2014/main" id="{91D89DC0-3FD1-AEAA-2E43-17FD95F7ABA3}"/>
               </a:ext>
             </a:extLst>
           </p:cNvPr>
@@ -5208,18 +4743,18 @@
           <a:lstStyle/>
           <a:p>
             <a:r>
-              <a:rPr lang="ja-JP" altLang="en-US" dirty="0"/>
-              <a:t>プロットから文章やスライドへ</a:t>
+              <a:rPr kumimoji="1" lang="ja-JP" altLang="en-US" dirty="0"/>
+              <a:t>各文を適切に接続する</a:t>
             </a:r>
           </a:p>
         </p:txBody>
       </p:sp>
       <p:sp>
         <p:nvSpPr>
-          <p:cNvPr id="5" name="テキスト プレースホルダー 4">
-            <a:extLst>
-              <a:ext uri="{FF2B5EF4-FFF2-40B4-BE49-F238E27FC236}">
-                <a16:creationId xmlns:a16="http://schemas.microsoft.com/office/drawing/2014/main" id="{24288186-ECCC-F136-8196-B4294566CB12}"/>
+          <p:cNvPr id="3" name="テキスト プレースホルダー 2">
+            <a:extLst>
+              <a:ext uri="{FF2B5EF4-FFF2-40B4-BE49-F238E27FC236}">
+                <a16:creationId xmlns:a16="http://schemas.microsoft.com/office/drawing/2014/main" id="{5BC3025A-7B01-BA2E-4B61-9B87B1743DAB}"/>
               </a:ext>
             </a:extLst>
           </p:cNvPr>
@@ -5236,122 +4771,85 @@
           <a:lstStyle/>
           <a:p>
             <a:r>
-              <a:rPr lang="ja-JP" altLang="en-US" dirty="0"/>
-              <a:t>プロットと文章の違い：</a:t>
-            </a:r>
-            <a:endParaRPr lang="en-US" altLang="ja-JP" dirty="0"/>
+              <a:rPr kumimoji="1" lang="ja-JP" altLang="en-US" dirty="0"/>
+              <a:t>なにも考えずに文を短くするとぶつ切れになる</a:t>
+            </a:r>
+            <a:endParaRPr kumimoji="1" lang="en-US" altLang="ja-JP" dirty="0"/>
           </a:p>
           <a:p>
             <a:pPr lvl="1"/>
             <a:r>
-              <a:rPr lang="ja-JP" altLang="en-US" dirty="0"/>
-              <a:t>プロットは論理の階層構造を単に表せば良い</a:t>
-            </a:r>
-            <a:endParaRPr lang="en-US" altLang="ja-JP" dirty="0"/>
+              <a:rPr kumimoji="1" lang="ja-JP" altLang="en-US" dirty="0"/>
+              <a:t>元々なんとなく繋がっていた気がしていただけで，</a:t>
+            </a:r>
+            <a:br>
+              <a:rPr kumimoji="1" lang="en-US" altLang="ja-JP" dirty="0"/>
+            </a:br>
+            <a:r>
+              <a:rPr kumimoji="1" lang="ja-JP" altLang="en-US" dirty="0"/>
+              <a:t>実は論理的に接続されていないとこうなりがち</a:t>
+            </a:r>
+            <a:endParaRPr kumimoji="1" lang="en-US" altLang="ja-JP" dirty="0"/>
+          </a:p>
+          <a:p>
+            <a:r>
+              <a:rPr kumimoji="1" lang="ja-JP" altLang="en-US" dirty="0"/>
+              <a:t>文同士を接続する方法</a:t>
+            </a:r>
+            <a:endParaRPr kumimoji="1" lang="en-US" altLang="ja-JP" dirty="0"/>
+          </a:p>
+          <a:p>
+            <a:pPr marL="817200" lvl="1" indent="-457200">
+              <a:buFont typeface="+mj-lt"/>
+              <a:buAutoNum type="arabicPeriod"/>
+            </a:pPr>
+            <a:r>
+              <a:rPr kumimoji="1" lang="ja-JP" altLang="en-US" dirty="0"/>
+              <a:t>接続詞を適切に入れる</a:t>
+            </a:r>
+            <a:endParaRPr kumimoji="1" lang="en-US" altLang="ja-JP" dirty="0"/>
           </a:p>
           <a:p>
             <a:pPr lvl="2"/>
             <a:r>
-              <a:rPr lang="ja-JP" altLang="en-US" dirty="0"/>
-              <a:t>子は親にぶら下がっている事で視覚的に論理関係がわかる</a:t>
-            </a:r>
-            <a:endParaRPr lang="en-US" altLang="ja-JP" dirty="0"/>
+              <a:rPr kumimoji="1" lang="ja-JP" altLang="en-US" dirty="0"/>
+              <a:t>「したがって」</a:t>
+            </a:r>
+            <a:endParaRPr kumimoji="1" lang="en-US" altLang="ja-JP" dirty="0"/>
           </a:p>
           <a:p>
             <a:pPr lvl="2"/>
             <a:r>
-              <a:rPr lang="ja-JP" altLang="en-US" dirty="0"/>
-              <a:t>つなぎの言葉は通常あまり書かない</a:t>
-            </a:r>
-            <a:endParaRPr lang="en-US" altLang="ja-JP" dirty="0"/>
-          </a:p>
-          <a:p>
-            <a:pPr lvl="1"/>
-            <a:r>
-              <a:rPr lang="ja-JP" altLang="en-US" dirty="0"/>
-              <a:t>しかし，文章（スライド）は基本的にシーケンシャル</a:t>
-            </a:r>
-            <a:endParaRPr lang="en-US" altLang="ja-JP" dirty="0"/>
+              <a:rPr kumimoji="1" lang="ja-JP" altLang="en-US" dirty="0"/>
+              <a:t>「なぜなら」</a:t>
+            </a:r>
+            <a:endParaRPr kumimoji="1" lang="en-US" altLang="ja-JP" dirty="0"/>
           </a:p>
           <a:p>
             <a:pPr lvl="2"/>
             <a:r>
-              <a:rPr lang="ja-JP" altLang="en-US" dirty="0"/>
-              <a:t>文章は前から後ろにむかって順に読むもの</a:t>
-            </a:r>
-            <a:endParaRPr lang="en-US" altLang="ja-JP" dirty="0"/>
-          </a:p>
-          <a:p>
-            <a:pPr lvl="2"/>
-            <a:r>
-              <a:rPr lang="ja-JP" altLang="en-US" dirty="0">
-                <a:solidFill>
-                  <a:schemeClr val="accent5"/>
-                </a:solidFill>
-              </a:rPr>
-              <a:t>前から読んでわかる順序に論理を展開し，それぞれにつなぎを入れる必要がある</a:t>
-            </a:r>
-            <a:endParaRPr lang="en-US" altLang="ja-JP" dirty="0">
-              <a:solidFill>
-                <a:schemeClr val="accent5"/>
-              </a:solidFill>
-            </a:endParaRPr>
-          </a:p>
-          <a:p>
-            <a:r>
-              <a:rPr lang="ja-JP" altLang="en-US" dirty="0"/>
-              <a:t>課題：</a:t>
-            </a:r>
-            <a:br>
-              <a:rPr lang="en-US" altLang="ja-JP" dirty="0"/>
-            </a:br>
-            <a:r>
-              <a:rPr lang="ja-JP" altLang="en-US" dirty="0"/>
-              <a:t>プロットの論理をどのようにシーケンシャルな文章に展開するか？</a:t>
-            </a:r>
-            <a:endParaRPr lang="en-US" altLang="ja-JP" dirty="0"/>
-          </a:p>
-        </p:txBody>
-      </p:sp>
-      <p:sp>
-        <p:nvSpPr>
-          <p:cNvPr id="2" name="スライド番号プレースホルダー 1">
-            <a:extLst>
-              <a:ext uri="{FF2B5EF4-FFF2-40B4-BE49-F238E27FC236}">
-                <a16:creationId xmlns:a16="http://schemas.microsoft.com/office/drawing/2014/main" id="{CFEF9DC9-89E4-71EE-05DF-89E205E66070}"/>
-              </a:ext>
-            </a:extLst>
-          </p:cNvPr>
-          <p:cNvSpPr>
-            <a:spLocks noGrp="1"/>
-          </p:cNvSpPr>
-          <p:nvPr>
-            <p:ph type="sldNum" sz="quarter" idx="4294967295"/>
-          </p:nvPr>
-        </p:nvSpPr>
-        <p:spPr>
-          <a:xfrm>
-            <a:off x="8531225" y="6308725"/>
-            <a:ext cx="612775" cy="549275"/>
-          </a:xfrm>
-        </p:spPr>
-        <p:txBody>
-          <a:bodyPr/>
-          <a:lstStyle/>
-          <a:p>
-            <a:fld id="{D2D8002D-B5B0-4BAC-B1F6-782DDCCE6D9C}" type="slidenum">
-              <a:rPr kumimoji="1" lang="ja-JP" altLang="en-US" smtClean="0"/>
-              <a:pPr/>
-              <a:t>20</a:t>
-            </a:fld>
-            <a:endParaRPr kumimoji="1" lang="ja-JP" altLang="en-US"/>
+              <a:rPr kumimoji="1" lang="ja-JP" altLang="en-US" dirty="0"/>
+              <a:t>「しかし」</a:t>
+            </a:r>
+            <a:endParaRPr kumimoji="1" lang="en-US" altLang="ja-JP" dirty="0"/>
+          </a:p>
+          <a:p>
+            <a:pPr marL="817200" lvl="1" indent="-457200">
+              <a:buFont typeface="+mj-lt"/>
+              <a:buAutoNum type="arabicPeriod"/>
+            </a:pPr>
+            <a:r>
+              <a:rPr kumimoji="1" lang="ja-JP" altLang="en-US" dirty="0"/>
+              <a:t>文内の論理的な繋がりを使う</a:t>
+            </a:r>
+            <a:endParaRPr kumimoji="1" lang="en-US" altLang="ja-JP" dirty="0"/>
           </a:p>
         </p:txBody>
       </p:sp>
     </p:spTree>
     <p:extLst>
       <p:ext uri="{BB962C8B-B14F-4D97-AF65-F5344CB8AC3E}">
-        <p14:creationId xmlns:p14="http://schemas.microsoft.com/office/powerpoint/2010/main" val="4034395818"/>
+        <p14:creationId xmlns:p14="http://schemas.microsoft.com/office/powerpoint/2010/main" val="308663371"/>
       </p:ext>
     </p:extLst>
   </p:cSld>
@@ -5391,6 +4889,1137 @@
           <p:cNvPr id="2" name="タイトル 1">
             <a:extLst>
               <a:ext uri="{FF2B5EF4-FFF2-40B4-BE49-F238E27FC236}">
+                <a16:creationId xmlns:a16="http://schemas.microsoft.com/office/drawing/2014/main" id="{0AA3E805-C8B0-4B62-0EE7-64CFD041C187}"/>
+              </a:ext>
+            </a:extLst>
+          </p:cNvPr>
+          <p:cNvSpPr>
+            <a:spLocks noGrp="1"/>
+          </p:cNvSpPr>
+          <p:nvPr>
+            <p:ph type="title"/>
+          </p:nvPr>
+        </p:nvSpPr>
+        <p:spPr/>
+        <p:txBody>
+          <a:bodyPr/>
+          <a:lstStyle/>
+          <a:p>
+            <a:r>
+              <a:rPr kumimoji="1" lang="ja-JP" altLang="en-US" dirty="0"/>
+              <a:t>論理的な繋がりを使った文の接続１</a:t>
+            </a:r>
+          </a:p>
+        </p:txBody>
+      </p:sp>
+      <p:sp>
+        <p:nvSpPr>
+          <p:cNvPr id="3" name="テキスト プレースホルダー 2">
+            <a:extLst>
+              <a:ext uri="{FF2B5EF4-FFF2-40B4-BE49-F238E27FC236}">
+                <a16:creationId xmlns:a16="http://schemas.microsoft.com/office/drawing/2014/main" id="{60ADC020-2198-50F1-6F94-34B8CBB0F2D4}"/>
+              </a:ext>
+            </a:extLst>
+          </p:cNvPr>
+          <p:cNvSpPr>
+            <a:spLocks noGrp="1"/>
+          </p:cNvSpPr>
+          <p:nvPr>
+            <p:ph type="body" sz="quarter" idx="10"/>
+          </p:nvPr>
+        </p:nvSpPr>
+        <p:spPr/>
+        <p:txBody>
+          <a:bodyPr/>
+          <a:lstStyle/>
+          <a:p>
+            <a:r>
+              <a:rPr kumimoji="1" lang="ja-JP" altLang="en-US" sz="1800" dirty="0">
+                <a:solidFill>
+                  <a:schemeClr val="accent5"/>
+                </a:solidFill>
+              </a:rPr>
+              <a:t>そこより前の文に出てくる単語や事象を入れると自然に繋がる</a:t>
+            </a:r>
+            <a:endParaRPr kumimoji="1" lang="en-US" altLang="ja-JP" sz="1800" dirty="0">
+              <a:solidFill>
+                <a:schemeClr val="accent5"/>
+              </a:solidFill>
+            </a:endParaRPr>
+          </a:p>
+          <a:p>
+            <a:pPr lvl="1"/>
+            <a:r>
+              <a:rPr kumimoji="1" lang="ja-JP" altLang="en-US" sz="1800" dirty="0"/>
+              <a:t>そこまでの文の内容に新しい情報を付け足す形にする</a:t>
+            </a:r>
+            <a:endParaRPr kumimoji="1" lang="en-US" altLang="ja-JP" sz="1800" dirty="0"/>
+          </a:p>
+          <a:p>
+            <a:r>
+              <a:rPr kumimoji="1" lang="ja-JP" altLang="en-US" sz="1800" dirty="0"/>
+              <a:t>「</a:t>
+            </a:r>
+            <a:r>
+              <a:rPr kumimoji="1" lang="en-US" altLang="ja-JP" sz="1800" dirty="0"/>
+              <a:t>A </a:t>
+            </a:r>
+            <a:r>
+              <a:rPr kumimoji="1" lang="ja-JP" altLang="en-US" sz="1800" dirty="0"/>
+              <a:t>は </a:t>
+            </a:r>
+            <a:r>
+              <a:rPr kumimoji="1" lang="en-US" altLang="ja-JP" sz="1800" dirty="0"/>
+              <a:t>B </a:t>
+            </a:r>
+            <a:r>
+              <a:rPr kumimoji="1" lang="ja-JP" altLang="en-US" sz="1800" dirty="0"/>
+              <a:t>である．なぜなら </a:t>
+            </a:r>
+            <a:r>
+              <a:rPr lang="en-US" altLang="ja-JP" sz="1800" dirty="0"/>
+              <a:t>B </a:t>
+            </a:r>
+            <a:r>
+              <a:rPr lang="ja-JP" altLang="en-US" sz="1800" dirty="0"/>
+              <a:t>は </a:t>
+            </a:r>
+            <a:r>
+              <a:rPr lang="en-US" altLang="ja-JP" sz="1800" dirty="0"/>
+              <a:t>C </a:t>
+            </a:r>
+            <a:r>
+              <a:rPr lang="ja-JP" altLang="en-US" sz="1800" dirty="0"/>
+              <a:t>だからだ</a:t>
+            </a:r>
+            <a:r>
+              <a:rPr kumimoji="1" lang="ja-JP" altLang="en-US" sz="1800" dirty="0"/>
+              <a:t>」の後に繋げる文を考える</a:t>
+            </a:r>
+            <a:endParaRPr kumimoji="1" lang="en-US" altLang="ja-JP" sz="1800" dirty="0"/>
+          </a:p>
+          <a:p>
+            <a:pPr lvl="1"/>
+            <a:r>
+              <a:rPr kumimoji="1" lang="ja-JP" altLang="en-US" sz="1800" dirty="0"/>
+              <a:t>良い例：</a:t>
+            </a:r>
+            <a:endParaRPr kumimoji="1" lang="en-US" altLang="ja-JP" sz="1800" dirty="0"/>
+          </a:p>
+          <a:p>
+            <a:pPr lvl="2"/>
+            <a:r>
+              <a:rPr kumimoji="1" lang="ja-JP" altLang="en-US" sz="1800" dirty="0"/>
+              <a:t>「この </a:t>
+            </a:r>
+            <a:r>
+              <a:rPr kumimoji="1" lang="en-US" altLang="ja-JP" sz="1800" dirty="0"/>
+              <a:t>B </a:t>
+            </a:r>
+            <a:r>
+              <a:rPr kumimoji="1" lang="ja-JP" altLang="en-US" sz="1800" dirty="0"/>
+              <a:t>は～という性質をもつ」</a:t>
+            </a:r>
+            <a:endParaRPr kumimoji="1" lang="en-US" altLang="ja-JP" sz="1800" dirty="0"/>
+          </a:p>
+          <a:p>
+            <a:pPr lvl="2"/>
+            <a:r>
+              <a:rPr kumimoji="1" lang="ja-JP" altLang="en-US" sz="1800" dirty="0"/>
+              <a:t>「この </a:t>
+            </a:r>
+            <a:r>
+              <a:rPr kumimoji="1" lang="en-US" altLang="ja-JP" sz="1800" dirty="0"/>
+              <a:t>C </a:t>
+            </a:r>
+            <a:r>
+              <a:rPr kumimoji="1" lang="ja-JP" altLang="en-US" sz="1800" dirty="0"/>
+              <a:t>は一般に </a:t>
+            </a:r>
+            <a:r>
+              <a:rPr kumimoji="1" lang="en-US" altLang="ja-JP" sz="1800" dirty="0"/>
+              <a:t>D </a:t>
+            </a:r>
+            <a:r>
+              <a:rPr kumimoji="1" lang="ja-JP" altLang="en-US" sz="1800" dirty="0"/>
+              <a:t>である」</a:t>
+            </a:r>
+            <a:endParaRPr kumimoji="1" lang="en-US" altLang="ja-JP" sz="1800" dirty="0"/>
+          </a:p>
+          <a:p>
+            <a:pPr lvl="1"/>
+            <a:r>
+              <a:rPr kumimoji="1" lang="ja-JP" altLang="en-US" sz="1800" dirty="0"/>
+              <a:t>だめな例：</a:t>
+            </a:r>
+            <a:endParaRPr kumimoji="1" lang="en-US" altLang="ja-JP" sz="1800" dirty="0"/>
+          </a:p>
+          <a:p>
+            <a:pPr lvl="2"/>
+            <a:r>
+              <a:rPr kumimoji="1" lang="ja-JP" altLang="en-US" sz="1800" dirty="0"/>
+              <a:t>「</a:t>
+            </a:r>
+            <a:r>
+              <a:rPr kumimoji="1" lang="en-US" altLang="ja-JP" sz="1800" dirty="0"/>
+              <a:t>E </a:t>
+            </a:r>
+            <a:r>
+              <a:rPr kumimoji="1" lang="ja-JP" altLang="en-US" sz="1800" dirty="0"/>
+              <a:t>は </a:t>
+            </a:r>
+            <a:r>
+              <a:rPr kumimoji="1" lang="en-US" altLang="ja-JP" sz="1800" dirty="0"/>
+              <a:t>F </a:t>
+            </a:r>
+            <a:r>
+              <a:rPr kumimoji="1" lang="ja-JP" altLang="en-US" sz="1800" dirty="0"/>
+              <a:t>である」（</a:t>
+            </a:r>
+            <a:r>
+              <a:rPr kumimoji="1" lang="en-US" altLang="ja-JP" sz="1800" dirty="0"/>
+              <a:t>E </a:t>
+            </a:r>
+            <a:r>
+              <a:rPr kumimoji="1" lang="ja-JP" altLang="en-US" sz="1800" dirty="0"/>
+              <a:t>も </a:t>
+            </a:r>
+            <a:r>
+              <a:rPr kumimoji="1" lang="en-US" altLang="ja-JP" sz="1800" dirty="0"/>
+              <a:t>F </a:t>
+            </a:r>
+            <a:r>
+              <a:rPr kumimoji="1" lang="ja-JP" altLang="en-US" sz="1800" dirty="0"/>
+              <a:t>も初登場なので繋がってない）</a:t>
+            </a:r>
+            <a:endParaRPr kumimoji="1" lang="en-US" altLang="ja-JP" sz="1800" dirty="0"/>
+          </a:p>
+        </p:txBody>
+      </p:sp>
+    </p:spTree>
+    <p:extLst>
+      <p:ext uri="{BB962C8B-B14F-4D97-AF65-F5344CB8AC3E}">
+        <p14:creationId xmlns:p14="http://schemas.microsoft.com/office/powerpoint/2010/main" val="1530409555"/>
+      </p:ext>
+    </p:extLst>
+  </p:cSld>
+  <p:clrMapOvr>
+    <a:masterClrMapping/>
+  </p:clrMapOvr>
+  <mc:AlternateContent xmlns:mc="http://schemas.openxmlformats.org/markup-compatibility/2006" xmlns:p14="http://schemas.microsoft.com/office/powerpoint/2010/main">
+    <mc:Choice Requires="p14">
+      <p:transition p14:dur="10"/>
+    </mc:Choice>
+    <mc:Fallback xmlns="">
+      <p:transition/>
+    </mc:Fallback>
+  </mc:AlternateContent>
+</p:sld>
+</file>
+
+<file path=ppt/slides/slide22.xml><?xml version="1.0" encoding="utf-8"?>
+<p:sld xmlns:a="http://schemas.openxmlformats.org/drawingml/2006/main" xmlns:r="http://schemas.openxmlformats.org/officeDocument/2006/relationships" xmlns:p="http://schemas.openxmlformats.org/presentationml/2006/main">
+  <p:cSld>
+    <p:spTree>
+      <p:nvGrpSpPr>
+        <p:cNvPr id="1" name=""/>
+        <p:cNvGrpSpPr/>
+        <p:nvPr/>
+      </p:nvGrpSpPr>
+      <p:grpSpPr>
+        <a:xfrm>
+          <a:off x="0" y="0"/>
+          <a:ext cx="0" cy="0"/>
+          <a:chOff x="0" y="0"/>
+          <a:chExt cx="0" cy="0"/>
+        </a:xfrm>
+      </p:grpSpPr>
+      <p:sp>
+        <p:nvSpPr>
+          <p:cNvPr id="2" name="タイトル 1">
+            <a:extLst>
+              <a:ext uri="{FF2B5EF4-FFF2-40B4-BE49-F238E27FC236}">
+                <a16:creationId xmlns:a16="http://schemas.microsoft.com/office/drawing/2014/main" id="{0AA3E805-C8B0-4B62-0EE7-64CFD041C187}"/>
+              </a:ext>
+            </a:extLst>
+          </p:cNvPr>
+          <p:cNvSpPr>
+            <a:spLocks noGrp="1"/>
+          </p:cNvSpPr>
+          <p:nvPr>
+            <p:ph type="title"/>
+          </p:nvPr>
+        </p:nvSpPr>
+        <p:spPr/>
+        <p:txBody>
+          <a:bodyPr/>
+          <a:lstStyle/>
+          <a:p>
+            <a:r>
+              <a:rPr kumimoji="1" lang="ja-JP" altLang="en-US" dirty="0"/>
+              <a:t>論理的な繋がりを使った文の接続２</a:t>
+            </a:r>
+          </a:p>
+        </p:txBody>
+      </p:sp>
+      <p:sp>
+        <p:nvSpPr>
+          <p:cNvPr id="3" name="テキスト プレースホルダー 2">
+            <a:extLst>
+              <a:ext uri="{FF2B5EF4-FFF2-40B4-BE49-F238E27FC236}">
+                <a16:creationId xmlns:a16="http://schemas.microsoft.com/office/drawing/2014/main" id="{60ADC020-2198-50F1-6F94-34B8CBB0F2D4}"/>
+              </a:ext>
+            </a:extLst>
+          </p:cNvPr>
+          <p:cNvSpPr>
+            <a:spLocks noGrp="1"/>
+          </p:cNvSpPr>
+          <p:nvPr>
+            <p:ph type="body" sz="quarter" idx="10"/>
+          </p:nvPr>
+        </p:nvSpPr>
+        <p:spPr/>
+        <p:txBody>
+          <a:bodyPr/>
+          <a:lstStyle/>
+          <a:p>
+            <a:r>
+              <a:rPr kumimoji="1" lang="ja-JP" altLang="en-US" sz="1800" dirty="0">
+                <a:solidFill>
+                  <a:schemeClr val="accent5"/>
+                </a:solidFill>
+              </a:rPr>
+              <a:t>各文内の前の方に，（なるべく近くの）既出の単語や事象を置く</a:t>
+            </a:r>
+            <a:endParaRPr kumimoji="1" lang="en-US" altLang="ja-JP" sz="1800" dirty="0"/>
+          </a:p>
+          <a:p>
+            <a:pPr lvl="1"/>
+            <a:r>
+              <a:rPr kumimoji="1" lang="ja-JP" altLang="en-US" sz="1800" dirty="0"/>
+              <a:t>既出の単語が，長い文の後半で初めて出てくるのは良くない</a:t>
+            </a:r>
+            <a:endParaRPr kumimoji="1" lang="en-US" altLang="ja-JP" sz="1800" dirty="0"/>
+          </a:p>
+          <a:p>
+            <a:pPr lvl="1"/>
+            <a:r>
+              <a:rPr kumimoji="1" lang="ja-JP" altLang="en-US" sz="1800" dirty="0"/>
+              <a:t>その文を最後まで読まないと，接続関係がわからない</a:t>
+            </a:r>
+            <a:endParaRPr kumimoji="1" lang="en-US" altLang="ja-JP" sz="1800" dirty="0"/>
+          </a:p>
+          <a:p>
+            <a:r>
+              <a:rPr kumimoji="1" lang="ja-JP" altLang="en-US" sz="1800" dirty="0"/>
+              <a:t>また「</a:t>
+            </a:r>
+            <a:r>
+              <a:rPr kumimoji="1" lang="en-US" altLang="ja-JP" sz="1800" dirty="0"/>
+              <a:t>A </a:t>
+            </a:r>
+            <a:r>
+              <a:rPr kumimoji="1" lang="ja-JP" altLang="en-US" sz="1800" dirty="0"/>
+              <a:t>は </a:t>
+            </a:r>
+            <a:r>
+              <a:rPr kumimoji="1" lang="en-US" altLang="ja-JP" sz="1800" dirty="0"/>
+              <a:t>B </a:t>
+            </a:r>
+            <a:r>
+              <a:rPr kumimoji="1" lang="ja-JP" altLang="en-US" sz="1800" dirty="0"/>
+              <a:t>である．なぜなら </a:t>
+            </a:r>
+            <a:r>
+              <a:rPr lang="en-US" altLang="ja-JP" sz="1800" dirty="0"/>
+              <a:t>B </a:t>
+            </a:r>
+            <a:r>
+              <a:rPr lang="ja-JP" altLang="en-US" sz="1800" dirty="0"/>
+              <a:t>は </a:t>
+            </a:r>
+            <a:r>
+              <a:rPr lang="en-US" altLang="ja-JP" sz="1800" b="1" dirty="0">
+                <a:solidFill>
+                  <a:schemeClr val="accent5"/>
+                </a:solidFill>
+              </a:rPr>
+              <a:t>C</a:t>
+            </a:r>
+            <a:r>
+              <a:rPr lang="en-US" altLang="ja-JP" sz="1800" dirty="0"/>
+              <a:t> </a:t>
+            </a:r>
+            <a:r>
+              <a:rPr lang="ja-JP" altLang="en-US" sz="1800" dirty="0"/>
+              <a:t>だからだ</a:t>
+            </a:r>
+            <a:r>
+              <a:rPr kumimoji="1" lang="ja-JP" altLang="en-US" sz="1800" dirty="0"/>
+              <a:t>」の後に繋げる文を考える</a:t>
+            </a:r>
+            <a:endParaRPr kumimoji="1" lang="en-US" altLang="ja-JP" sz="1800" dirty="0"/>
+          </a:p>
+          <a:p>
+            <a:pPr lvl="1"/>
+            <a:r>
+              <a:rPr kumimoji="1" lang="ja-JP" altLang="en-US" sz="1800" dirty="0"/>
+              <a:t>だめな例：</a:t>
+            </a:r>
+            <a:endParaRPr kumimoji="1" lang="en-US" altLang="ja-JP" sz="1800" dirty="0"/>
+          </a:p>
+          <a:p>
+            <a:pPr lvl="2"/>
+            <a:r>
+              <a:rPr kumimoji="1" lang="ja-JP" altLang="en-US" sz="1800" dirty="0"/>
+              <a:t>「～は～であり，そのため～は </a:t>
+            </a:r>
+            <a:r>
+              <a:rPr kumimoji="1" lang="en-US" altLang="ja-JP" sz="1800" b="1" dirty="0">
+                <a:solidFill>
+                  <a:schemeClr val="accent5"/>
+                </a:solidFill>
+              </a:rPr>
+              <a:t>C</a:t>
+            </a:r>
+            <a:r>
+              <a:rPr kumimoji="1" lang="en-US" altLang="ja-JP" sz="1800" dirty="0"/>
+              <a:t> </a:t>
+            </a:r>
+            <a:r>
+              <a:rPr kumimoji="1" lang="ja-JP" altLang="en-US" sz="1800" dirty="0"/>
+              <a:t>である」</a:t>
+            </a:r>
+            <a:endParaRPr kumimoji="1" lang="en-US" altLang="ja-JP" sz="1800" dirty="0"/>
+          </a:p>
+          <a:p>
+            <a:pPr lvl="2"/>
+            <a:r>
+              <a:rPr kumimoji="1" lang="en-US" altLang="ja-JP" sz="1800" dirty="0"/>
+              <a:t>C </a:t>
+            </a:r>
+            <a:r>
+              <a:rPr kumimoji="1" lang="ja-JP" altLang="en-US" sz="1800" dirty="0"/>
+              <a:t>が最後に出てくるので，そこまで読まないと関係がわからない</a:t>
+            </a:r>
+            <a:endParaRPr kumimoji="1" lang="en-US" altLang="ja-JP" sz="1800" dirty="0"/>
+          </a:p>
+          <a:p>
+            <a:pPr lvl="1"/>
+            <a:r>
+              <a:rPr kumimoji="1" lang="ja-JP" altLang="en-US" sz="1800" dirty="0"/>
+              <a:t>良い例：</a:t>
+            </a:r>
+            <a:endParaRPr kumimoji="1" lang="en-US" altLang="ja-JP" sz="1800" dirty="0"/>
+          </a:p>
+          <a:p>
+            <a:pPr lvl="2"/>
+            <a:r>
+              <a:rPr kumimoji="1" lang="ja-JP" altLang="en-US" sz="1800" dirty="0"/>
+              <a:t>「～は </a:t>
+            </a:r>
+            <a:r>
+              <a:rPr kumimoji="1" lang="en-US" altLang="ja-JP" sz="1800" b="1" dirty="0">
+                <a:solidFill>
+                  <a:schemeClr val="accent5"/>
+                </a:solidFill>
+              </a:rPr>
+              <a:t>C</a:t>
+            </a:r>
+            <a:r>
+              <a:rPr kumimoji="1" lang="en-US" altLang="ja-JP" sz="1800" dirty="0"/>
+              <a:t> </a:t>
+            </a:r>
+            <a:r>
+              <a:rPr kumimoji="1" lang="ja-JP" altLang="en-US" sz="1800" dirty="0"/>
+              <a:t>である．なぜなら～は～であるためである」</a:t>
+            </a:r>
+            <a:endParaRPr kumimoji="1" lang="en-US" altLang="ja-JP" sz="1800" dirty="0"/>
+          </a:p>
+        </p:txBody>
+      </p:sp>
+    </p:spTree>
+    <p:extLst>
+      <p:ext uri="{BB962C8B-B14F-4D97-AF65-F5344CB8AC3E}">
+        <p14:creationId xmlns:p14="http://schemas.microsoft.com/office/powerpoint/2010/main" val="3414039066"/>
+      </p:ext>
+    </p:extLst>
+  </p:cSld>
+  <p:clrMapOvr>
+    <a:masterClrMapping/>
+  </p:clrMapOvr>
+  <mc:AlternateContent xmlns:mc="http://schemas.openxmlformats.org/markup-compatibility/2006" xmlns:p14="http://schemas.microsoft.com/office/powerpoint/2010/main">
+    <mc:Choice Requires="p14">
+      <p:transition p14:dur="10"/>
+    </mc:Choice>
+    <mc:Fallback xmlns="">
+      <p:transition/>
+    </mc:Fallback>
+  </mc:AlternateContent>
+</p:sld>
+</file>
+
+<file path=ppt/slides/slide23.xml><?xml version="1.0" encoding="utf-8"?>
+<p:sld xmlns:a="http://schemas.openxmlformats.org/drawingml/2006/main" xmlns:r="http://schemas.openxmlformats.org/officeDocument/2006/relationships" xmlns:p="http://schemas.openxmlformats.org/presentationml/2006/main">
+  <p:cSld>
+    <p:spTree>
+      <p:nvGrpSpPr>
+        <p:cNvPr id="1" name=""/>
+        <p:cNvGrpSpPr/>
+        <p:nvPr/>
+      </p:nvGrpSpPr>
+      <p:grpSpPr>
+        <a:xfrm>
+          <a:off x="0" y="0"/>
+          <a:ext cx="0" cy="0"/>
+          <a:chOff x="0" y="0"/>
+          <a:chExt cx="0" cy="0"/>
+        </a:xfrm>
+      </p:grpSpPr>
+      <p:sp>
+        <p:nvSpPr>
+          <p:cNvPr id="2" name="タイトル 1">
+            <a:extLst>
+              <a:ext uri="{FF2B5EF4-FFF2-40B4-BE49-F238E27FC236}">
+                <a16:creationId xmlns:a16="http://schemas.microsoft.com/office/drawing/2014/main" id="{97F43A36-1241-4642-C35D-F2423024AF7E}"/>
+              </a:ext>
+            </a:extLst>
+          </p:cNvPr>
+          <p:cNvSpPr>
+            <a:spLocks noGrp="1"/>
+          </p:cNvSpPr>
+          <p:nvPr>
+            <p:ph type="title"/>
+          </p:nvPr>
+        </p:nvSpPr>
+        <p:spPr/>
+        <p:txBody>
+          <a:bodyPr/>
+          <a:lstStyle/>
+          <a:p>
+            <a:r>
+              <a:rPr kumimoji="1" lang="ja-JP" altLang="en-US" dirty="0"/>
+              <a:t>論理的な繋がりを使った文の接続３</a:t>
+            </a:r>
+          </a:p>
+        </p:txBody>
+      </p:sp>
+      <p:sp>
+        <p:nvSpPr>
+          <p:cNvPr id="3" name="テキスト プレースホルダー 2">
+            <a:extLst>
+              <a:ext uri="{FF2B5EF4-FFF2-40B4-BE49-F238E27FC236}">
+                <a16:creationId xmlns:a16="http://schemas.microsoft.com/office/drawing/2014/main" id="{0AE5F184-FC3A-2542-0079-3B39E1BBBD63}"/>
+              </a:ext>
+            </a:extLst>
+          </p:cNvPr>
+          <p:cNvSpPr>
+            <a:spLocks noGrp="1"/>
+          </p:cNvSpPr>
+          <p:nvPr>
+            <p:ph type="body" sz="quarter" idx="10"/>
+          </p:nvPr>
+        </p:nvSpPr>
+        <p:spPr/>
+        <p:txBody>
+          <a:bodyPr/>
+          <a:lstStyle/>
+          <a:p>
+            <a:r>
+              <a:rPr kumimoji="1" lang="ja-JP" altLang="en-US" dirty="0"/>
+              <a:t>最初に要素や単語を列挙してから，ぶらさげる</a:t>
+            </a:r>
+            <a:endParaRPr kumimoji="1" lang="en-US" altLang="ja-JP" dirty="0"/>
+          </a:p>
+          <a:p>
+            <a:pPr lvl="1"/>
+            <a:r>
+              <a:rPr kumimoji="1" lang="ja-JP" altLang="en-US" dirty="0"/>
+              <a:t>この後ろに列挙した要素の説明がくることが自然に伝わる</a:t>
+            </a:r>
+            <a:endParaRPr kumimoji="1" lang="en-US" altLang="ja-JP" dirty="0"/>
+          </a:p>
+          <a:p>
+            <a:r>
+              <a:rPr kumimoji="1" lang="ja-JP" altLang="en-US" dirty="0"/>
+              <a:t>例：</a:t>
+            </a:r>
+            <a:endParaRPr kumimoji="1" lang="en-US" altLang="ja-JP" dirty="0"/>
+          </a:p>
+          <a:p>
+            <a:pPr lvl="1"/>
+            <a:r>
+              <a:rPr kumimoji="1" lang="ja-JP" altLang="en-US" dirty="0"/>
+              <a:t>「</a:t>
+            </a:r>
+            <a:r>
+              <a:rPr kumimoji="1" lang="en-US" altLang="ja-JP" dirty="0"/>
+              <a:t>A </a:t>
+            </a:r>
+            <a:r>
+              <a:rPr kumimoji="1" lang="ja-JP" altLang="en-US" dirty="0"/>
+              <a:t>には </a:t>
+            </a:r>
+            <a:r>
+              <a:rPr kumimoji="1" lang="en-US" altLang="ja-JP" dirty="0"/>
+              <a:t>B </a:t>
+            </a:r>
+            <a:r>
+              <a:rPr kumimoji="1" lang="ja-JP" altLang="en-US" dirty="0"/>
+              <a:t>と </a:t>
+            </a:r>
+            <a:r>
+              <a:rPr kumimoji="1" lang="en-US" altLang="ja-JP" dirty="0"/>
+              <a:t>C </a:t>
+            </a:r>
+            <a:r>
+              <a:rPr kumimoji="1" lang="ja-JP" altLang="en-US" dirty="0"/>
+              <a:t>がある」</a:t>
+            </a:r>
+            <a:endParaRPr kumimoji="1" lang="en-US" altLang="ja-JP" dirty="0"/>
+          </a:p>
+          <a:p>
+            <a:pPr lvl="2"/>
+            <a:r>
+              <a:rPr kumimoji="1" lang="ja-JP" altLang="en-US" dirty="0"/>
+              <a:t>「</a:t>
+            </a:r>
+            <a:r>
+              <a:rPr kumimoji="1" lang="en-US" altLang="ja-JP" dirty="0"/>
+              <a:t>B </a:t>
+            </a:r>
+            <a:r>
+              <a:rPr kumimoji="1" lang="ja-JP" altLang="en-US" dirty="0"/>
+              <a:t>は～である」</a:t>
+            </a:r>
+            <a:endParaRPr kumimoji="1" lang="en-US" altLang="ja-JP" dirty="0"/>
+          </a:p>
+          <a:p>
+            <a:pPr lvl="2"/>
+            <a:r>
+              <a:rPr kumimoji="1" lang="ja-JP" altLang="en-US" dirty="0"/>
+              <a:t>「一方で </a:t>
+            </a:r>
+            <a:r>
+              <a:rPr kumimoji="1" lang="en-US" altLang="ja-JP" dirty="0"/>
+              <a:t>C </a:t>
+            </a:r>
+            <a:r>
+              <a:rPr kumimoji="1" lang="ja-JP" altLang="en-US" dirty="0"/>
+              <a:t>は～である」</a:t>
+            </a:r>
+            <a:br>
+              <a:rPr kumimoji="1" lang="en-US" altLang="ja-JP" dirty="0"/>
+            </a:br>
+            <a:endParaRPr kumimoji="1" lang="en-US" altLang="ja-JP" dirty="0"/>
+          </a:p>
+          <a:p>
+            <a:pPr lvl="1"/>
+            <a:r>
+              <a:rPr kumimoji="1" lang="ja-JP" altLang="en-US" dirty="0"/>
+              <a:t>「～は以下の手順で行われる」</a:t>
+            </a:r>
+            <a:endParaRPr kumimoji="1" lang="en-US" altLang="ja-JP" dirty="0"/>
+          </a:p>
+          <a:p>
+            <a:pPr lvl="2"/>
+            <a:r>
+              <a:rPr kumimoji="1" lang="ja-JP" altLang="en-US" dirty="0"/>
+              <a:t>「</a:t>
+            </a:r>
+            <a:r>
+              <a:rPr kumimoji="1" lang="en-US" altLang="ja-JP" dirty="0"/>
+              <a:t>1.</a:t>
+            </a:r>
+            <a:r>
+              <a:rPr kumimoji="1" lang="ja-JP" altLang="en-US" dirty="0"/>
+              <a:t>」「</a:t>
+            </a:r>
+            <a:r>
+              <a:rPr kumimoji="1" lang="en-US" altLang="ja-JP" dirty="0"/>
+              <a:t>2.</a:t>
+            </a:r>
+            <a:r>
+              <a:rPr kumimoji="1" lang="ja-JP" altLang="en-US" dirty="0"/>
+              <a:t>」「</a:t>
+            </a:r>
+            <a:r>
+              <a:rPr kumimoji="1" lang="en-US" altLang="ja-JP" dirty="0"/>
+              <a:t>3.</a:t>
+            </a:r>
+            <a:r>
+              <a:rPr kumimoji="1" lang="ja-JP" altLang="en-US" dirty="0"/>
+              <a:t>」</a:t>
+            </a:r>
+            <a:endParaRPr kumimoji="1" lang="en-US" altLang="ja-JP" dirty="0"/>
+          </a:p>
+          <a:p>
+            <a:pPr lvl="1"/>
+            <a:r>
+              <a:rPr kumimoji="1" lang="ja-JP" altLang="en-US" dirty="0"/>
+              <a:t>「～は以下の２つの理由からなる」</a:t>
+            </a:r>
+            <a:endParaRPr kumimoji="1" lang="en-US" altLang="ja-JP" dirty="0"/>
+          </a:p>
+          <a:p>
+            <a:pPr lvl="2"/>
+            <a:r>
+              <a:rPr kumimoji="1" lang="ja-JP" altLang="en-US" dirty="0"/>
+              <a:t>「</a:t>
+            </a:r>
+            <a:r>
+              <a:rPr kumimoji="1" lang="en-US" altLang="ja-JP" dirty="0"/>
+              <a:t>1.</a:t>
+            </a:r>
+            <a:r>
+              <a:rPr kumimoji="1" lang="ja-JP" altLang="en-US" dirty="0"/>
+              <a:t>」「</a:t>
+            </a:r>
+            <a:r>
+              <a:rPr kumimoji="1" lang="en-US" altLang="ja-JP" dirty="0"/>
+              <a:t>2.</a:t>
+            </a:r>
+            <a:r>
+              <a:rPr kumimoji="1" lang="ja-JP" altLang="en-US" dirty="0"/>
+              <a:t>」</a:t>
+            </a:r>
+            <a:endParaRPr kumimoji="1" lang="en-US" altLang="ja-JP" dirty="0"/>
+          </a:p>
+          <a:p>
+            <a:pPr lvl="1"/>
+            <a:endParaRPr kumimoji="1" lang="ja-JP" altLang="en-US" dirty="0"/>
+          </a:p>
+        </p:txBody>
+      </p:sp>
+    </p:spTree>
+    <p:extLst>
+      <p:ext uri="{BB962C8B-B14F-4D97-AF65-F5344CB8AC3E}">
+        <p14:creationId xmlns:p14="http://schemas.microsoft.com/office/powerpoint/2010/main" val="2236628389"/>
+      </p:ext>
+    </p:extLst>
+  </p:cSld>
+  <p:clrMapOvr>
+    <a:masterClrMapping/>
+  </p:clrMapOvr>
+  <mc:AlternateContent xmlns:mc="http://schemas.openxmlformats.org/markup-compatibility/2006" xmlns:p14="http://schemas.microsoft.com/office/powerpoint/2010/main">
+    <mc:Choice Requires="p14">
+      <p:transition p14:dur="10"/>
+    </mc:Choice>
+    <mc:Fallback xmlns="">
+      <p:transition/>
+    </mc:Fallback>
+  </mc:AlternateContent>
+</p:sld>
+</file>
+
+<file path=ppt/slides/slide24.xml><?xml version="1.0" encoding="utf-8"?>
+<p:sld xmlns:a="http://schemas.openxmlformats.org/drawingml/2006/main" xmlns:r="http://schemas.openxmlformats.org/officeDocument/2006/relationships" xmlns:p="http://schemas.openxmlformats.org/presentationml/2006/main">
+  <p:cSld>
+    <p:spTree>
+      <p:nvGrpSpPr>
+        <p:cNvPr id="1" name=""/>
+        <p:cNvGrpSpPr/>
+        <p:nvPr/>
+      </p:nvGrpSpPr>
+      <p:grpSpPr>
+        <a:xfrm>
+          <a:off x="0" y="0"/>
+          <a:ext cx="0" cy="0"/>
+          <a:chOff x="0" y="0"/>
+          <a:chExt cx="0" cy="0"/>
+        </a:xfrm>
+      </p:grpSpPr>
+      <p:sp>
+        <p:nvSpPr>
+          <p:cNvPr id="2" name="タイトル 1">
+            <a:extLst>
+              <a:ext uri="{FF2B5EF4-FFF2-40B4-BE49-F238E27FC236}">
+                <a16:creationId xmlns:a16="http://schemas.microsoft.com/office/drawing/2014/main" id="{29EE214D-6E7A-0357-0756-680B63295B42}"/>
+              </a:ext>
+            </a:extLst>
+          </p:cNvPr>
+          <p:cNvSpPr>
+            <a:spLocks noGrp="1"/>
+          </p:cNvSpPr>
+          <p:nvPr>
+            <p:ph type="title"/>
+          </p:nvPr>
+        </p:nvSpPr>
+        <p:spPr/>
+        <p:txBody>
+          <a:bodyPr/>
+          <a:lstStyle/>
+          <a:p>
+            <a:r>
+              <a:rPr lang="ja-JP" altLang="en-US" dirty="0"/>
+              <a:t>パラグラフや文内の接続：古い情報と新しい情報</a:t>
+            </a:r>
+            <a:endParaRPr kumimoji="1" lang="ja-JP" altLang="en-US" dirty="0"/>
+          </a:p>
+        </p:txBody>
+      </p:sp>
+      <p:sp>
+        <p:nvSpPr>
+          <p:cNvPr id="3" name="テキスト プレースホルダー 2">
+            <a:extLst>
+              <a:ext uri="{FF2B5EF4-FFF2-40B4-BE49-F238E27FC236}">
+                <a16:creationId xmlns:a16="http://schemas.microsoft.com/office/drawing/2014/main" id="{73E7C1C9-4BB8-6905-4AC9-D99FB1224F57}"/>
+              </a:ext>
+            </a:extLst>
+          </p:cNvPr>
+          <p:cNvSpPr>
+            <a:spLocks noGrp="1"/>
+          </p:cNvSpPr>
+          <p:nvPr>
+            <p:ph type="body" sz="quarter" idx="10"/>
+          </p:nvPr>
+        </p:nvSpPr>
+        <p:spPr/>
+        <p:txBody>
+          <a:bodyPr/>
+          <a:lstStyle/>
+          <a:p>
+            <a:r>
+              <a:rPr lang="ja-JP" altLang="en-US" dirty="0"/>
+              <a:t>パラグラフ内の各文</a:t>
+            </a:r>
+            <a:endParaRPr lang="en-US" altLang="ja-JP" dirty="0"/>
+          </a:p>
+          <a:p>
+            <a:pPr lvl="1"/>
+            <a:r>
+              <a:rPr kumimoji="1" lang="ja-JP" altLang="en-US" dirty="0"/>
+              <a:t>トピック・センテンス </a:t>
+            </a:r>
+            <a:r>
+              <a:rPr kumimoji="1" lang="en-US" altLang="ja-JP" dirty="0"/>
+              <a:t>or </a:t>
+            </a:r>
+            <a:r>
+              <a:rPr kumimoji="1" lang="ja-JP" altLang="en-US" dirty="0"/>
+              <a:t>それまでのサポーティング・センテンスで触れた内容に必ず繋がっている</a:t>
+            </a:r>
+            <a:endParaRPr kumimoji="1" lang="en-US" altLang="ja-JP" dirty="0"/>
+          </a:p>
+          <a:p>
+            <a:pPr lvl="1"/>
+            <a:r>
+              <a:rPr kumimoji="1" lang="ja-JP" altLang="en-US" dirty="0"/>
+              <a:t>そこまでに現れていない概念や単語だけで構成された文を入れてはいけない</a:t>
+            </a:r>
+            <a:endParaRPr kumimoji="1" lang="en-US" altLang="ja-JP" dirty="0"/>
+          </a:p>
+          <a:p>
+            <a:pPr lvl="2"/>
+            <a:r>
+              <a:rPr kumimoji="1" lang="ja-JP" altLang="en-US" dirty="0"/>
+              <a:t>その後まで読んではじめて意味がわかるようなものはだめ</a:t>
+            </a:r>
+          </a:p>
+        </p:txBody>
+      </p:sp>
+    </p:spTree>
+    <p:extLst>
+      <p:ext uri="{BB962C8B-B14F-4D97-AF65-F5344CB8AC3E}">
+        <p14:creationId xmlns:p14="http://schemas.microsoft.com/office/powerpoint/2010/main" val="1929943680"/>
+      </p:ext>
+    </p:extLst>
+  </p:cSld>
+  <p:clrMapOvr>
+    <a:masterClrMapping/>
+  </p:clrMapOvr>
+  <mc:AlternateContent xmlns:mc="http://schemas.openxmlformats.org/markup-compatibility/2006" xmlns:p14="http://schemas.microsoft.com/office/powerpoint/2010/main">
+    <mc:Choice Requires="p14">
+      <p:transition p14:dur="10"/>
+    </mc:Choice>
+    <mc:Fallback xmlns="">
+      <p:transition/>
+    </mc:Fallback>
+  </mc:AlternateContent>
+</p:sld>
+</file>
+
+<file path=ppt/slides/slide25.xml><?xml version="1.0" encoding="utf-8"?>
+<p:sld xmlns:a="http://schemas.openxmlformats.org/drawingml/2006/main" xmlns:r="http://schemas.openxmlformats.org/officeDocument/2006/relationships" xmlns:p="http://schemas.openxmlformats.org/presentationml/2006/main">
+  <p:cSld>
+    <p:spTree>
+      <p:nvGrpSpPr>
+        <p:cNvPr id="1" name=""/>
+        <p:cNvGrpSpPr/>
+        <p:nvPr/>
+      </p:nvGrpSpPr>
+      <p:grpSpPr>
+        <a:xfrm>
+          <a:off x="0" y="0"/>
+          <a:ext cx="0" cy="0"/>
+          <a:chOff x="0" y="0"/>
+          <a:chExt cx="0" cy="0"/>
+        </a:xfrm>
+      </p:grpSpPr>
+      <p:sp>
+        <p:nvSpPr>
+          <p:cNvPr id="6" name="タイトル 5">
+            <a:extLst>
+              <a:ext uri="{FF2B5EF4-FFF2-40B4-BE49-F238E27FC236}">
+                <a16:creationId xmlns:a16="http://schemas.microsoft.com/office/drawing/2014/main" id="{D44FC4B2-BE5F-0B62-A30B-6488B98CA7F1}"/>
+              </a:ext>
+            </a:extLst>
+          </p:cNvPr>
+          <p:cNvSpPr>
+            <a:spLocks noGrp="1"/>
+          </p:cNvSpPr>
+          <p:nvPr>
+            <p:ph type="title"/>
+          </p:nvPr>
+        </p:nvSpPr>
+        <p:spPr/>
+        <p:txBody>
+          <a:bodyPr/>
+          <a:lstStyle/>
+          <a:p>
+            <a:r>
+              <a:rPr lang="ja-JP" altLang="en-US" dirty="0"/>
+              <a:t>プロットから文章への展開</a:t>
+            </a:r>
+            <a:endParaRPr lang="en-US" altLang="ja-JP" dirty="0"/>
+          </a:p>
+        </p:txBody>
+      </p:sp>
+    </p:spTree>
+    <p:extLst>
+      <p:ext uri="{BB962C8B-B14F-4D97-AF65-F5344CB8AC3E}">
+        <p14:creationId xmlns:p14="http://schemas.microsoft.com/office/powerpoint/2010/main" val="3590338157"/>
+      </p:ext>
+    </p:extLst>
+  </p:cSld>
+  <p:clrMapOvr>
+    <a:masterClrMapping/>
+  </p:clrMapOvr>
+</p:sld>
+</file>
+
+<file path=ppt/slides/slide26.xml><?xml version="1.0" encoding="utf-8"?>
+<p:sld xmlns:a="http://schemas.openxmlformats.org/drawingml/2006/main" xmlns:r="http://schemas.openxmlformats.org/officeDocument/2006/relationships" xmlns:p="http://schemas.openxmlformats.org/presentationml/2006/main">
+  <p:cSld>
+    <p:spTree>
+      <p:nvGrpSpPr>
+        <p:cNvPr id="1" name=""/>
+        <p:cNvGrpSpPr/>
+        <p:nvPr/>
+      </p:nvGrpSpPr>
+      <p:grpSpPr>
+        <a:xfrm>
+          <a:off x="0" y="0"/>
+          <a:ext cx="0" cy="0"/>
+          <a:chOff x="0" y="0"/>
+          <a:chExt cx="0" cy="0"/>
+        </a:xfrm>
+      </p:grpSpPr>
+      <p:sp>
+        <p:nvSpPr>
+          <p:cNvPr id="4" name="タイトル 3">
+            <a:extLst>
+              <a:ext uri="{FF2B5EF4-FFF2-40B4-BE49-F238E27FC236}">
+                <a16:creationId xmlns:a16="http://schemas.microsoft.com/office/drawing/2014/main" id="{6562E51A-24AB-589C-C10B-60BA2743CF86}"/>
+              </a:ext>
+            </a:extLst>
+          </p:cNvPr>
+          <p:cNvSpPr>
+            <a:spLocks noGrp="1"/>
+          </p:cNvSpPr>
+          <p:nvPr>
+            <p:ph type="title"/>
+          </p:nvPr>
+        </p:nvSpPr>
+        <p:spPr/>
+        <p:txBody>
+          <a:bodyPr/>
+          <a:lstStyle/>
+          <a:p>
+            <a:r>
+              <a:rPr lang="ja-JP" altLang="en-US" dirty="0"/>
+              <a:t>プロットから文章やスライドへ</a:t>
+            </a:r>
+          </a:p>
+        </p:txBody>
+      </p:sp>
+      <p:sp>
+        <p:nvSpPr>
+          <p:cNvPr id="5" name="テキスト プレースホルダー 4">
+            <a:extLst>
+              <a:ext uri="{FF2B5EF4-FFF2-40B4-BE49-F238E27FC236}">
+                <a16:creationId xmlns:a16="http://schemas.microsoft.com/office/drawing/2014/main" id="{24288186-ECCC-F136-8196-B4294566CB12}"/>
+              </a:ext>
+            </a:extLst>
+          </p:cNvPr>
+          <p:cNvSpPr>
+            <a:spLocks noGrp="1"/>
+          </p:cNvSpPr>
+          <p:nvPr>
+            <p:ph type="body" sz="quarter" idx="10"/>
+          </p:nvPr>
+        </p:nvSpPr>
+        <p:spPr/>
+        <p:txBody>
+          <a:bodyPr/>
+          <a:lstStyle/>
+          <a:p>
+            <a:r>
+              <a:rPr lang="ja-JP" altLang="en-US" dirty="0"/>
+              <a:t>プロットと文章の違い：</a:t>
+            </a:r>
+            <a:endParaRPr lang="en-US" altLang="ja-JP" dirty="0"/>
+          </a:p>
+          <a:p>
+            <a:pPr lvl="1"/>
+            <a:r>
+              <a:rPr lang="ja-JP" altLang="en-US" dirty="0"/>
+              <a:t>プロットは論理の階層構造を単に表せば良い</a:t>
+            </a:r>
+            <a:endParaRPr lang="en-US" altLang="ja-JP" dirty="0"/>
+          </a:p>
+          <a:p>
+            <a:pPr lvl="2"/>
+            <a:r>
+              <a:rPr lang="ja-JP" altLang="en-US" dirty="0"/>
+              <a:t>子は親にぶら下がっている事で視覚的に論理関係がわかる</a:t>
+            </a:r>
+            <a:endParaRPr lang="en-US" altLang="ja-JP" dirty="0"/>
+          </a:p>
+          <a:p>
+            <a:pPr lvl="2"/>
+            <a:r>
+              <a:rPr lang="ja-JP" altLang="en-US" dirty="0"/>
+              <a:t>つなぎの言葉は通常あまり書かない</a:t>
+            </a:r>
+            <a:endParaRPr lang="en-US" altLang="ja-JP" dirty="0"/>
+          </a:p>
+          <a:p>
+            <a:pPr lvl="1"/>
+            <a:r>
+              <a:rPr lang="ja-JP" altLang="en-US" dirty="0"/>
+              <a:t>しかし，文章（スライド）は基本的にシーケンシャル</a:t>
+            </a:r>
+            <a:endParaRPr lang="en-US" altLang="ja-JP" dirty="0"/>
+          </a:p>
+          <a:p>
+            <a:pPr lvl="2"/>
+            <a:r>
+              <a:rPr lang="ja-JP" altLang="en-US" dirty="0"/>
+              <a:t>文章は前から後ろにむかって順に読むもの</a:t>
+            </a:r>
+            <a:endParaRPr lang="en-US" altLang="ja-JP" dirty="0"/>
+          </a:p>
+          <a:p>
+            <a:pPr lvl="2"/>
+            <a:r>
+              <a:rPr lang="ja-JP" altLang="en-US" dirty="0">
+                <a:solidFill>
+                  <a:schemeClr val="accent5"/>
+                </a:solidFill>
+              </a:rPr>
+              <a:t>前から読んでわかる順序に論理を展開し，それぞれにつなぎを入れる必要がある</a:t>
+            </a:r>
+            <a:endParaRPr lang="en-US" altLang="ja-JP" dirty="0">
+              <a:solidFill>
+                <a:schemeClr val="accent5"/>
+              </a:solidFill>
+            </a:endParaRPr>
+          </a:p>
+          <a:p>
+            <a:r>
+              <a:rPr lang="ja-JP" altLang="en-US" dirty="0"/>
+              <a:t>課題：</a:t>
+            </a:r>
+            <a:br>
+              <a:rPr lang="en-US" altLang="ja-JP" dirty="0"/>
+            </a:br>
+            <a:r>
+              <a:rPr lang="ja-JP" altLang="en-US" dirty="0"/>
+              <a:t>プロットの論理をどのようにシーケンシャルな文章に展開するか？</a:t>
+            </a:r>
+            <a:endParaRPr lang="en-US" altLang="ja-JP" dirty="0"/>
+          </a:p>
+        </p:txBody>
+      </p:sp>
+      <p:sp>
+        <p:nvSpPr>
+          <p:cNvPr id="2" name="スライド番号プレースホルダー 1">
+            <a:extLst>
+              <a:ext uri="{FF2B5EF4-FFF2-40B4-BE49-F238E27FC236}">
+                <a16:creationId xmlns:a16="http://schemas.microsoft.com/office/drawing/2014/main" id="{CFEF9DC9-89E4-71EE-05DF-89E205E66070}"/>
+              </a:ext>
+            </a:extLst>
+          </p:cNvPr>
+          <p:cNvSpPr>
+            <a:spLocks noGrp="1"/>
+          </p:cNvSpPr>
+          <p:nvPr>
+            <p:ph type="sldNum" sz="quarter" idx="4294967295"/>
+          </p:nvPr>
+        </p:nvSpPr>
+        <p:spPr>
+          <a:xfrm>
+            <a:off x="8531225" y="6308725"/>
+            <a:ext cx="612775" cy="549275"/>
+          </a:xfrm>
+        </p:spPr>
+        <p:txBody>
+          <a:bodyPr/>
+          <a:lstStyle/>
+          <a:p>
+            <a:fld id="{D2D8002D-B5B0-4BAC-B1F6-782DDCCE6D9C}" type="slidenum">
+              <a:rPr kumimoji="1" lang="ja-JP" altLang="en-US" smtClean="0"/>
+              <a:pPr/>
+              <a:t>26</a:t>
+            </a:fld>
+            <a:endParaRPr kumimoji="1" lang="ja-JP" altLang="en-US"/>
+          </a:p>
+        </p:txBody>
+      </p:sp>
+    </p:spTree>
+    <p:extLst>
+      <p:ext uri="{BB962C8B-B14F-4D97-AF65-F5344CB8AC3E}">
+        <p14:creationId xmlns:p14="http://schemas.microsoft.com/office/powerpoint/2010/main" val="4034395818"/>
+      </p:ext>
+    </p:extLst>
+  </p:cSld>
+  <p:clrMapOvr>
+    <a:masterClrMapping/>
+  </p:clrMapOvr>
+  <mc:AlternateContent xmlns:mc="http://schemas.openxmlformats.org/markup-compatibility/2006" xmlns:p14="http://schemas.microsoft.com/office/powerpoint/2010/main">
+    <mc:Choice Requires="p14">
+      <p:transition p14:dur="10"/>
+    </mc:Choice>
+    <mc:Fallback xmlns="">
+      <p:transition/>
+    </mc:Fallback>
+  </mc:AlternateContent>
+</p:sld>
+</file>
+
+<file path=ppt/slides/slide27.xml><?xml version="1.0" encoding="utf-8"?>
+<p:sld xmlns:a="http://schemas.openxmlformats.org/drawingml/2006/main" xmlns:r="http://schemas.openxmlformats.org/officeDocument/2006/relationships" xmlns:p="http://schemas.openxmlformats.org/presentationml/2006/main">
+  <p:cSld>
+    <p:spTree>
+      <p:nvGrpSpPr>
+        <p:cNvPr id="1" name=""/>
+        <p:cNvGrpSpPr/>
+        <p:nvPr/>
+      </p:nvGrpSpPr>
+      <p:grpSpPr>
+        <a:xfrm>
+          <a:off x="0" y="0"/>
+          <a:ext cx="0" cy="0"/>
+          <a:chOff x="0" y="0"/>
+          <a:chExt cx="0" cy="0"/>
+        </a:xfrm>
+      </p:grpSpPr>
+      <p:sp>
+        <p:nvSpPr>
+          <p:cNvPr id="2" name="タイトル 1">
+            <a:extLst>
+              <a:ext uri="{FF2B5EF4-FFF2-40B4-BE49-F238E27FC236}">
                 <a16:creationId xmlns:a16="http://schemas.microsoft.com/office/drawing/2014/main" id="{76460A38-7213-E877-786C-852C28C01C66}"/>
               </a:ext>
             </a:extLst>
@@ -5595,7 +6224,7 @@
 </p:sld>
 </file>
 
-<file path=ppt/slides/slide22.xml><?xml version="1.0" encoding="utf-8"?>
+<file path=ppt/slides/slide28.xml><?xml version="1.0" encoding="utf-8"?>
 <p:sld xmlns:a="http://schemas.openxmlformats.org/drawingml/2006/main" xmlns:r="http://schemas.openxmlformats.org/officeDocument/2006/relationships" xmlns:p="http://schemas.openxmlformats.org/presentationml/2006/main">
   <p:cSld>
     <p:spTree>
@@ -9181,7 +9810,7 @@
 </p:sld>
 </file>
 
-<file path=ppt/slides/slide23.xml><?xml version="1.0" encoding="utf-8"?>
+<file path=ppt/slides/slide29.xml><?xml version="1.0" encoding="utf-8"?>
 <p:sld xmlns:a="http://schemas.openxmlformats.org/drawingml/2006/main" xmlns:r="http://schemas.openxmlformats.org/officeDocument/2006/relationships" xmlns:p="http://schemas.openxmlformats.org/presentationml/2006/main">
   <p:cSld>
     <p:spTree>
@@ -12970,9 +13599,8 @@
             </a:pPr>
             <a:r>
               <a:rPr kumimoji="1" lang="ja-JP" altLang="en-US" dirty="0"/>
-              <a:t>文章の書き方＝文の配置とつなぐ方法</a:t>
-            </a:r>
-            <a:endParaRPr kumimoji="1" lang="en-US" altLang="ja-JP" dirty="0"/>
+              <a:t>パラグラフ</a:t>
+            </a:r>
           </a:p>
           <a:p>
             <a:pPr marL="457200" indent="-457200">
@@ -12981,7 +13609,7 @@
             </a:pPr>
             <a:r>
               <a:rPr lang="ja-JP" altLang="en-US" dirty="0"/>
-              <a:t>文の書き方</a:t>
+              <a:t>文</a:t>
             </a:r>
             <a:endParaRPr lang="en-US" altLang="ja-JP" dirty="0"/>
           </a:p>
@@ -12991,9 +13619,21 @@
               <a:buAutoNum type="arabicPeriod"/>
             </a:pPr>
             <a:r>
-              <a:rPr kumimoji="1" lang="ja-JP" altLang="en-US" dirty="0"/>
-              <a:t>パラグラフ</a:t>
-            </a:r>
+              <a:rPr lang="ja-JP" altLang="en-US" dirty="0"/>
+              <a:t>文の接続</a:t>
+            </a:r>
+            <a:endParaRPr lang="en-US" altLang="ja-JP" dirty="0"/>
+          </a:p>
+          <a:p>
+            <a:pPr marL="457200" indent="-457200">
+              <a:buFont typeface="+mj-lt"/>
+              <a:buAutoNum type="arabicPeriod"/>
+            </a:pPr>
+            <a:r>
+              <a:rPr lang="ja-JP" altLang="en-US" dirty="0"/>
+              <a:t>プロットから文章への展開</a:t>
+            </a:r>
+            <a:endParaRPr lang="en-US" altLang="ja-JP" dirty="0"/>
           </a:p>
         </p:txBody>
       </p:sp>
@@ -13037,6 +13677,65 @@
       </p:grpSpPr>
       <p:sp>
         <p:nvSpPr>
+          <p:cNvPr id="6" name="タイトル 5">
+            <a:extLst>
+              <a:ext uri="{FF2B5EF4-FFF2-40B4-BE49-F238E27FC236}">
+                <a16:creationId xmlns:a16="http://schemas.microsoft.com/office/drawing/2014/main" id="{D44FC4B2-BE5F-0B62-A30B-6488B98CA7F1}"/>
+              </a:ext>
+            </a:extLst>
+          </p:cNvPr>
+          <p:cNvSpPr>
+            <a:spLocks noGrp="1"/>
+          </p:cNvSpPr>
+          <p:nvPr>
+            <p:ph type="title"/>
+          </p:nvPr>
+        </p:nvSpPr>
+        <p:spPr/>
+        <p:txBody>
+          <a:bodyPr/>
+          <a:lstStyle/>
+          <a:p>
+            <a:r>
+              <a:rPr lang="ja-JP" altLang="en-US" dirty="0"/>
+              <a:t>文章とは</a:t>
+            </a:r>
+            <a:endParaRPr lang="en-US" dirty="0"/>
+          </a:p>
+        </p:txBody>
+      </p:sp>
+    </p:spTree>
+    <p:extLst>
+      <p:ext uri="{BB962C8B-B14F-4D97-AF65-F5344CB8AC3E}">
+        <p14:creationId xmlns:p14="http://schemas.microsoft.com/office/powerpoint/2010/main" val="265921179"/>
+      </p:ext>
+    </p:extLst>
+  </p:cSld>
+  <p:clrMapOvr>
+    <a:masterClrMapping/>
+  </p:clrMapOvr>
+</p:sld>
+</file>
+
+<file path=ppt/slides/slide6.xml><?xml version="1.0" encoding="utf-8"?>
+<p:sld xmlns:a="http://schemas.openxmlformats.org/drawingml/2006/main" xmlns:r="http://schemas.openxmlformats.org/officeDocument/2006/relationships" xmlns:p="http://schemas.openxmlformats.org/presentationml/2006/main">
+  <p:cSld>
+    <p:spTree>
+      <p:nvGrpSpPr>
+        <p:cNvPr id="1" name=""/>
+        <p:cNvGrpSpPr/>
+        <p:nvPr/>
+      </p:nvGrpSpPr>
+      <p:grpSpPr>
+        <a:xfrm>
+          <a:off x="0" y="0"/>
+          <a:ext cx="0" cy="0"/>
+          <a:chOff x="0" y="0"/>
+          <a:chExt cx="0" cy="0"/>
+        </a:xfrm>
+      </p:grpSpPr>
+      <p:sp>
+        <p:nvSpPr>
           <p:cNvPr id="2" name="タイトル 1">
             <a:extLst>
               <a:ext uri="{FF2B5EF4-FFF2-40B4-BE49-F238E27FC236}">
@@ -13165,7 +13864,7 @@
 </p:sld>
 </file>
 
-<file path=ppt/slides/slide6.xml><?xml version="1.0" encoding="utf-8"?>
+<file path=ppt/slides/slide7.xml><?xml version="1.0" encoding="utf-8"?>
 <p:sld xmlns:a="http://schemas.openxmlformats.org/drawingml/2006/main" xmlns:r="http://schemas.openxmlformats.org/officeDocument/2006/relationships" xmlns:p="http://schemas.openxmlformats.org/presentationml/2006/main">
   <p:cSld>
     <p:spTree>
@@ -14934,157 +15633,6 @@
 </p:sld>
 </file>
 
-<file path=ppt/slides/slide7.xml><?xml version="1.0" encoding="utf-8"?>
-<p:sld xmlns:a="http://schemas.openxmlformats.org/drawingml/2006/main" xmlns:r="http://schemas.openxmlformats.org/officeDocument/2006/relationships" xmlns:p="http://schemas.openxmlformats.org/presentationml/2006/main">
-  <p:cSld>
-    <p:spTree>
-      <p:nvGrpSpPr>
-        <p:cNvPr id="1" name=""/>
-        <p:cNvGrpSpPr/>
-        <p:nvPr/>
-      </p:nvGrpSpPr>
-      <p:grpSpPr>
-        <a:xfrm>
-          <a:off x="0" y="0"/>
-          <a:ext cx="0" cy="0"/>
-          <a:chOff x="0" y="0"/>
-          <a:chExt cx="0" cy="0"/>
-        </a:xfrm>
-      </p:grpSpPr>
-      <p:sp>
-        <p:nvSpPr>
-          <p:cNvPr id="2" name="タイトル 1">
-            <a:extLst>
-              <a:ext uri="{FF2B5EF4-FFF2-40B4-BE49-F238E27FC236}">
-                <a16:creationId xmlns:a16="http://schemas.microsoft.com/office/drawing/2014/main" id="{85895AA1-C3F6-5137-D327-90AEE8D8717F}"/>
-              </a:ext>
-            </a:extLst>
-          </p:cNvPr>
-          <p:cNvSpPr>
-            <a:spLocks noGrp="1"/>
-          </p:cNvSpPr>
-          <p:nvPr>
-            <p:ph type="title"/>
-          </p:nvPr>
-        </p:nvSpPr>
-        <p:spPr/>
-        <p:txBody>
-          <a:bodyPr/>
-          <a:lstStyle/>
-          <a:p>
-            <a:r>
-              <a:rPr kumimoji="1" lang="ja-JP" altLang="en-US" dirty="0"/>
-              <a:t>パラグラフ</a:t>
-            </a:r>
-          </a:p>
-        </p:txBody>
-      </p:sp>
-      <p:sp>
-        <p:nvSpPr>
-          <p:cNvPr id="3" name="テキスト プレースホルダー 2">
-            <a:extLst>
-              <a:ext uri="{FF2B5EF4-FFF2-40B4-BE49-F238E27FC236}">
-                <a16:creationId xmlns:a16="http://schemas.microsoft.com/office/drawing/2014/main" id="{AF7DC518-51F8-FA2A-0A74-B2DB18D49FC7}"/>
-              </a:ext>
-            </a:extLst>
-          </p:cNvPr>
-          <p:cNvSpPr>
-            <a:spLocks noGrp="1"/>
-          </p:cNvSpPr>
-          <p:nvPr>
-            <p:ph type="body" sz="quarter" idx="10"/>
-          </p:nvPr>
-        </p:nvSpPr>
-        <p:spPr/>
-        <p:txBody>
-          <a:bodyPr/>
-          <a:lstStyle/>
-          <a:p>
-            <a:r>
-              <a:rPr kumimoji="1" lang="ja-JP" altLang="en-US" dirty="0">
-                <a:solidFill>
-                  <a:schemeClr val="accent5"/>
-                </a:solidFill>
-              </a:rPr>
-              <a:t>１つの主張</a:t>
-            </a:r>
-            <a:r>
-              <a:rPr kumimoji="1" lang="ja-JP" altLang="en-US" dirty="0"/>
-              <a:t>を述べるための，複数の文からなるまとまり</a:t>
-            </a:r>
-            <a:endParaRPr kumimoji="1" lang="en-US" altLang="ja-JP" dirty="0"/>
-          </a:p>
-          <a:p>
-            <a:pPr lvl="1"/>
-            <a:r>
-              <a:rPr kumimoji="1" lang="ja-JP" altLang="en-US" dirty="0"/>
-              <a:t>パラグラフ内に違う主張をいれてはならない</a:t>
-            </a:r>
-            <a:endParaRPr kumimoji="1" lang="en-US" altLang="ja-JP" dirty="0"/>
-          </a:p>
-          <a:p>
-            <a:r>
-              <a:rPr kumimoji="1" lang="ja-JP" altLang="en-US" dirty="0"/>
-              <a:t>以下の種類の複数の文からなる</a:t>
-            </a:r>
-            <a:endParaRPr kumimoji="1" lang="en-US" altLang="ja-JP" dirty="0"/>
-          </a:p>
-          <a:p>
-            <a:pPr marL="817200" lvl="1" indent="-457200">
-              <a:buFont typeface="+mj-lt"/>
-              <a:buAutoNum type="arabicPeriod"/>
-            </a:pPr>
-            <a:r>
-              <a:rPr lang="ja-JP" altLang="en-US" dirty="0"/>
-              <a:t>先頭：　トピック・センテンス</a:t>
-            </a:r>
-            <a:endParaRPr lang="en-US" altLang="ja-JP" dirty="0"/>
-          </a:p>
-          <a:p>
-            <a:pPr marL="817200" lvl="1" indent="-457200">
-              <a:buFont typeface="+mj-lt"/>
-              <a:buAutoNum type="arabicPeriod"/>
-            </a:pPr>
-            <a:r>
-              <a:rPr kumimoji="1" lang="ja-JP" altLang="en-US" dirty="0"/>
-              <a:t>真ん中：サポーティング・センテンス</a:t>
-            </a:r>
-            <a:endParaRPr kumimoji="1" lang="en-US" altLang="ja-JP" dirty="0"/>
-          </a:p>
-          <a:p>
-            <a:pPr marL="817200" lvl="1" indent="-457200">
-              <a:buFont typeface="+mj-lt"/>
-              <a:buAutoNum type="arabicPeriod"/>
-            </a:pPr>
-            <a:r>
-              <a:rPr lang="ja-JP" altLang="en-US" dirty="0"/>
-              <a:t>最後：　コンクルーディング・センテンス</a:t>
-            </a:r>
-            <a:endParaRPr lang="en-US" altLang="ja-JP" dirty="0"/>
-          </a:p>
-        </p:txBody>
-      </p:sp>
-    </p:spTree>
-    <p:extLst>
-      <p:ext uri="{BB962C8B-B14F-4D97-AF65-F5344CB8AC3E}">
-        <p14:creationId xmlns:p14="http://schemas.microsoft.com/office/powerpoint/2010/main" val="2942226945"/>
-      </p:ext>
-    </p:extLst>
-  </p:cSld>
-  <p:clrMapOvr>
-    <a:masterClrMapping/>
-  </p:clrMapOvr>
-  <mc:AlternateContent xmlns:mc="http://schemas.openxmlformats.org/markup-compatibility/2006" xmlns:p14="http://schemas.microsoft.com/office/powerpoint/2010/main">
-    <mc:Choice Requires="p14">
-      <p:transition p14:dur="10"/>
-    </mc:Choice>
-    <mc:Fallback xmlns="">
-      <p:transition/>
-    </mc:Fallback>
-  </mc:AlternateContent>
-</p:sld>
-</file>
-
 <file path=ppt/slides/slide8.xml><?xml version="1.0" encoding="utf-8"?>
 <p:sld xmlns:a="http://schemas.openxmlformats.org/drawingml/2006/main" xmlns:r="http://schemas.openxmlformats.org/officeDocument/2006/relationships" xmlns:p="http://schemas.openxmlformats.org/presentationml/2006/main">
   <p:cSld>
@@ -15104,10 +15652,10 @@
       </p:grpSpPr>
       <p:sp>
         <p:nvSpPr>
-          <p:cNvPr id="2" name="タイトル 1">
-            <a:extLst>
-              <a:ext uri="{FF2B5EF4-FFF2-40B4-BE49-F238E27FC236}">
-                <a16:creationId xmlns:a16="http://schemas.microsoft.com/office/drawing/2014/main" id="{85895AA1-C3F6-5137-D327-90AEE8D8717F}"/>
+          <p:cNvPr id="6" name="タイトル 5">
+            <a:extLst>
+              <a:ext uri="{FF2B5EF4-FFF2-40B4-BE49-F238E27FC236}">
+                <a16:creationId xmlns:a16="http://schemas.microsoft.com/office/drawing/2014/main" id="{D44FC4B2-BE5F-0B62-A30B-6488B98CA7F1}"/>
               </a:ext>
             </a:extLst>
           </p:cNvPr>
@@ -15124,114 +15672,23 @@
           <a:lstStyle/>
           <a:p>
             <a:r>
-              <a:rPr kumimoji="1" lang="ja-JP" altLang="en-US" dirty="0"/>
-              <a:t>トピック・センテンス</a:t>
-            </a:r>
-          </a:p>
-        </p:txBody>
-      </p:sp>
-      <p:sp>
-        <p:nvSpPr>
-          <p:cNvPr id="3" name="テキスト プレースホルダー 2">
-            <a:extLst>
-              <a:ext uri="{FF2B5EF4-FFF2-40B4-BE49-F238E27FC236}">
-                <a16:creationId xmlns:a16="http://schemas.microsoft.com/office/drawing/2014/main" id="{AF7DC518-51F8-FA2A-0A74-B2DB18D49FC7}"/>
-              </a:ext>
-            </a:extLst>
-          </p:cNvPr>
-          <p:cNvSpPr>
-            <a:spLocks noGrp="1"/>
-          </p:cNvSpPr>
-          <p:nvPr>
-            <p:ph type="body" sz="quarter" idx="10"/>
-          </p:nvPr>
-        </p:nvSpPr>
-        <p:spPr/>
-        <p:txBody>
-          <a:bodyPr/>
-          <a:lstStyle/>
-          <a:p>
-            <a:r>
               <a:rPr lang="ja-JP" altLang="en-US" dirty="0"/>
-              <a:t>そのパラグラフ全体で述べたい主張をまとめた文</a:t>
-            </a:r>
-            <a:endParaRPr lang="en-US" altLang="ja-JP" dirty="0"/>
-          </a:p>
-          <a:p>
-            <a:pPr lvl="1"/>
-            <a:r>
-              <a:rPr lang="ja-JP" altLang="en-US" dirty="0"/>
-              <a:t>トピック・センテンスは各パラグラフに１つある</a:t>
-            </a:r>
-            <a:endParaRPr lang="en-US" altLang="ja-JP" dirty="0"/>
-          </a:p>
-          <a:p>
-            <a:pPr lvl="1"/>
-            <a:r>
-              <a:rPr lang="ja-JP" altLang="en-US" dirty="0"/>
-              <a:t>基本的にはそのパラグラフの先頭にある</a:t>
-            </a:r>
-            <a:endParaRPr lang="en-US" altLang="ja-JP" dirty="0"/>
-          </a:p>
-          <a:p>
-            <a:pPr lvl="2"/>
-            <a:r>
-              <a:rPr lang="ja-JP" altLang="en-US" dirty="0"/>
-              <a:t>前のパラグラフとの接続の関係で２文目等にくることもある</a:t>
-            </a:r>
-            <a:endParaRPr lang="en-US" altLang="ja-JP" dirty="0"/>
-          </a:p>
-          <a:p>
-            <a:r>
-              <a:rPr lang="ja-JP" altLang="en-US" dirty="0">
-                <a:solidFill>
-                  <a:schemeClr val="accent5"/>
-                </a:solidFill>
-              </a:rPr>
-              <a:t>各パラグラフのトピック・センテンスだけを取り出して繋げて読んでもおおよそ意味が通るようにする</a:t>
-            </a:r>
-            <a:endParaRPr lang="en-US" altLang="ja-JP" dirty="0">
-              <a:solidFill>
-                <a:schemeClr val="accent5"/>
-              </a:solidFill>
-            </a:endParaRPr>
-          </a:p>
-          <a:p>
-            <a:pPr lvl="1"/>
-            <a:r>
-              <a:rPr lang="ja-JP" altLang="en-US" dirty="0"/>
-              <a:t>トピック・センテンスはパラグラフの主張をまとめたもの</a:t>
-            </a:r>
-            <a:endParaRPr lang="en-US" altLang="ja-JP" dirty="0"/>
-          </a:p>
-          <a:p>
-            <a:pPr lvl="1"/>
-            <a:r>
-              <a:rPr lang="ja-JP" altLang="en-US" dirty="0"/>
-              <a:t>そこだけを取り出せば，おおまかな全体の主張がわかる</a:t>
-            </a:r>
-            <a:endParaRPr lang="en-US" altLang="ja-JP" dirty="0"/>
+              <a:t>パラグラフ</a:t>
+            </a:r>
+            <a:endParaRPr lang="en-US" dirty="0"/>
           </a:p>
         </p:txBody>
       </p:sp>
     </p:spTree>
     <p:extLst>
       <p:ext uri="{BB962C8B-B14F-4D97-AF65-F5344CB8AC3E}">
-        <p14:creationId xmlns:p14="http://schemas.microsoft.com/office/powerpoint/2010/main" val="4163540200"/>
+        <p14:creationId xmlns:p14="http://schemas.microsoft.com/office/powerpoint/2010/main" val="3637064490"/>
       </p:ext>
     </p:extLst>
   </p:cSld>
   <p:clrMapOvr>
     <a:masterClrMapping/>
   </p:clrMapOvr>
-  <mc:AlternateContent xmlns:mc="http://schemas.openxmlformats.org/markup-compatibility/2006" xmlns:p14="http://schemas.microsoft.com/office/powerpoint/2010/main">
-    <mc:Choice Requires="p14">
-      <p:transition p14:dur="10"/>
-    </mc:Choice>
-    <mc:Fallback xmlns="">
-      <p:transition/>
-    </mc:Fallback>
-  </mc:AlternateContent>
 </p:sld>
 </file>
 
@@ -15275,7 +15732,7 @@
           <a:p>
             <a:r>
               <a:rPr kumimoji="1" lang="ja-JP" altLang="en-US" dirty="0"/>
-              <a:t>サポーティング・センテンス</a:t>
+              <a:t>パラグラフ</a:t>
             </a:r>
           </a:p>
         </p:txBody>
@@ -15302,60 +15759,73 @@
           <a:lstStyle/>
           <a:p>
             <a:r>
+              <a:rPr kumimoji="1" lang="ja-JP" altLang="en-US" dirty="0">
+                <a:solidFill>
+                  <a:schemeClr val="accent5"/>
+                </a:solidFill>
+              </a:rPr>
+              <a:t>１つの主張</a:t>
+            </a:r>
+            <a:r>
               <a:rPr kumimoji="1" lang="ja-JP" altLang="en-US" dirty="0"/>
-              <a:t>サポーティング・センテンス</a:t>
+              <a:t>を述べるための，複数の文からなるまとまり</a:t>
             </a:r>
             <a:endParaRPr kumimoji="1" lang="en-US" altLang="ja-JP" dirty="0"/>
           </a:p>
           <a:p>
             <a:pPr lvl="1"/>
             <a:r>
+              <a:rPr kumimoji="1" lang="ja-JP" altLang="en-US" dirty="0"/>
+              <a:t>パラグラフ内に違う主張をいれてはならない</a:t>
+            </a:r>
+            <a:endParaRPr kumimoji="1" lang="en-US" altLang="ja-JP" dirty="0"/>
+          </a:p>
+          <a:p>
+            <a:r>
+              <a:rPr kumimoji="1" lang="ja-JP" altLang="en-US" dirty="0"/>
+              <a:t>以下の種類の複数の文からなる</a:t>
+            </a:r>
+            <a:endParaRPr kumimoji="1" lang="en-US" altLang="ja-JP" dirty="0"/>
+          </a:p>
+          <a:p>
+            <a:pPr marL="817200" lvl="1" indent="-457200">
+              <a:buFont typeface="+mj-lt"/>
+              <a:buAutoNum type="arabicPeriod"/>
+            </a:pPr>
+            <a:r>
               <a:rPr lang="ja-JP" altLang="en-US" dirty="0"/>
-              <a:t>トピック・センテンスの主張を補強するための文</a:t>
+              <a:t>先頭：　トピック・センテンス</a:t>
             </a:r>
             <a:endParaRPr lang="en-US" altLang="ja-JP" dirty="0"/>
           </a:p>
           <a:p>
-            <a:pPr lvl="1"/>
+            <a:pPr marL="817200" lvl="1" indent="-457200">
+              <a:buFont typeface="+mj-lt"/>
+              <a:buAutoNum type="arabicPeriod"/>
+            </a:pPr>
             <a:r>
               <a:rPr kumimoji="1" lang="ja-JP" altLang="en-US" dirty="0"/>
-              <a:t>各パラグラフはサポーティング・センテンスを１～複数含む</a:t>
+              <a:t>真ん中：サポーティング・センテンス</a:t>
             </a:r>
             <a:endParaRPr kumimoji="1" lang="en-US" altLang="ja-JP" dirty="0"/>
           </a:p>
           <a:p>
+            <a:pPr marL="817200" lvl="1" indent="-457200">
+              <a:buFont typeface="+mj-lt"/>
+              <a:buAutoNum type="arabicPeriod"/>
+            </a:pPr>
             <a:r>
               <a:rPr lang="ja-JP" altLang="en-US" dirty="0"/>
-              <a:t>トピック・センテンスとの関係</a:t>
+              <a:t>最後：　コンクルーディング・センテンス</a:t>
             </a:r>
             <a:endParaRPr lang="en-US" altLang="ja-JP" dirty="0"/>
-          </a:p>
-          <a:p>
-            <a:pPr lvl="1"/>
-            <a:r>
-              <a:rPr kumimoji="1" lang="ja-JP" altLang="en-US" dirty="0"/>
-              <a:t>サポーティング・センテンスはトピック・センテンスの詳細を述べる関係にある</a:t>
-            </a:r>
-            <a:endParaRPr kumimoji="1" lang="en-US" altLang="ja-JP" dirty="0"/>
-          </a:p>
-          <a:p>
-            <a:pPr lvl="1"/>
-            <a:r>
-              <a:rPr kumimoji="1" lang="ja-JP" altLang="en-US" dirty="0"/>
-              <a:t>トピック・センテンスはサポーティング・センテンス達をまとめたものとなる</a:t>
-            </a:r>
-            <a:endParaRPr kumimoji="1" lang="en-US" altLang="ja-JP" dirty="0"/>
-          </a:p>
-          <a:p>
-            <a:pPr lvl="2"/>
-            <a:endParaRPr kumimoji="1" lang="en-US" altLang="ja-JP" dirty="0"/>
           </a:p>
         </p:txBody>
       </p:sp>
     </p:spTree>
     <p:extLst>
       <p:ext uri="{BB962C8B-B14F-4D97-AF65-F5344CB8AC3E}">
-        <p14:creationId xmlns:p14="http://schemas.microsoft.com/office/powerpoint/2010/main" val="1366793701"/>
+        <p14:creationId xmlns:p14="http://schemas.microsoft.com/office/powerpoint/2010/main" val="2942226945"/>
       </p:ext>
     </p:extLst>
   </p:cSld>

</xml_diff>